<commit_message>
Show me the code
</commit_message>
<xml_diff>
--- a/Drupal.pptx
+++ b/Drupal.pptx
@@ -6,10 +6,10 @@
     <p:sldMasterId id="2147483660" r:id="rId2"/>
   </p:sldMasterIdLst>
   <p:notesMasterIdLst>
-    <p:notesMasterId r:id="rId32"/>
+    <p:notesMasterId r:id="rId34"/>
   </p:notesMasterIdLst>
   <p:handoutMasterIdLst>
-    <p:handoutMasterId r:id="rId33"/>
+    <p:handoutMasterId r:id="rId35"/>
   </p:handoutMasterIdLst>
   <p:sldIdLst>
     <p:sldId id="256" r:id="rId3"/>
@@ -34,13 +34,15 @@
     <p:sldId id="294" r:id="rId22"/>
     <p:sldId id="295" r:id="rId23"/>
     <p:sldId id="299" r:id="rId24"/>
-    <p:sldId id="287" r:id="rId25"/>
-    <p:sldId id="286" r:id="rId26"/>
-    <p:sldId id="296" r:id="rId27"/>
-    <p:sldId id="260" r:id="rId28"/>
-    <p:sldId id="297" r:id="rId29"/>
-    <p:sldId id="261" r:id="rId30"/>
-    <p:sldId id="298" r:id="rId31"/>
+    <p:sldId id="300" r:id="rId25"/>
+    <p:sldId id="301" r:id="rId26"/>
+    <p:sldId id="287" r:id="rId27"/>
+    <p:sldId id="286" r:id="rId28"/>
+    <p:sldId id="296" r:id="rId29"/>
+    <p:sldId id="260" r:id="rId30"/>
+    <p:sldId id="297" r:id="rId31"/>
+    <p:sldId id="261" r:id="rId32"/>
+    <p:sldId id="298" r:id="rId33"/>
   </p:sldIdLst>
   <p:sldSz cx="9144000" cy="6858000" type="screen4x3"/>
   <p:notesSz cx="6796088" cy="9907588"/>
@@ -8690,472 +8692,6 @@
                 </a:tabLst>
                 <a:defRPr/>
               </a:pPr>
-              <a:t>23</a:t>
-            </a:fld>
-            <a:endParaRPr kumimoji="0" lang="pt-PT" sz="1400" b="0" i="0" u="none" strike="noStrike" kern="1200" cap="none" spc="0" normalizeH="0" baseline="0" noProof="0">
-              <a:ln>
-                <a:noFill/>
-              </a:ln>
-              <a:solidFill>
-                <a:srgbClr val="000000"/>
-              </a:solidFill>
-              <a:effectLst/>
-              <a:uLnTx/>
-              <a:uFillTx/>
-              <a:latin typeface="Times New Roman" pitchFamily="18"/>
-              <a:ea typeface="DejaVu Sans" pitchFamily="2"/>
-              <a:cs typeface="DejaVu Sans" pitchFamily="2"/>
-            </a:endParaRPr>
-          </a:p>
-        </p:txBody>
-      </p:sp>
-      <p:sp>
-        <p:nvSpPr>
-          <p:cNvPr id="8" name="Slide Number Placeholder 6"/>
-          <p:cNvSpPr txBox="1">
-            <a:spLocks noGrp="1"/>
-          </p:cNvSpPr>
-          <p:nvPr/>
-        </p:nvSpPr>
-        <p:spPr>
-          <a:xfrm>
-            <a:off x="3846600" y="9411840"/>
-            <a:ext cx="2946239" cy="492120"/>
-          </a:xfrm>
-          <a:prstGeom prst="rect">
-            <a:avLst/>
-          </a:prstGeom>
-          <a:noFill/>
-          <a:ln/>
-        </p:spPr>
-        <p:txBody>
-          <a:bodyPr vert="horz" wrap="square" lIns="91440" tIns="45720" rIns="91440" bIns="45720" rtlCol="0" anchor="b" anchorCtr="0" compatLnSpc="1">
-            <a:noAutofit/>
-          </a:bodyPr>
-          <a:lstStyle/>
-          <a:p>
-            <a:pPr marL="0" marR="0" lvl="0" indent="0" algn="r" defTabSz="914400" rtl="0" eaLnBrk="1" fontAlgn="auto" latinLnBrk="0" hangingPunct="0">
-              <a:lnSpc>
-                <a:spcPct val="93000"/>
-              </a:lnSpc>
-              <a:spcBef>
-                <a:spcPts val="0"/>
-              </a:spcBef>
-              <a:spcAft>
-                <a:spcPts val="0"/>
-              </a:spcAft>
-              <a:buClrTx/>
-              <a:buSzTx/>
-              <a:buFontTx/>
-              <a:buNone/>
-              <a:tabLst>
-                <a:tab pos="0" algn="l"/>
-                <a:tab pos="448919" algn="l"/>
-                <a:tab pos="898199" algn="l"/>
-                <a:tab pos="1347480" algn="l"/>
-                <a:tab pos="1796760" algn="l"/>
-                <a:tab pos="2246040" algn="l"/>
-                <a:tab pos="2695320" algn="l"/>
-                <a:tab pos="3144600" algn="l"/>
-                <a:tab pos="3593880" algn="l"/>
-                <a:tab pos="4043159" algn="l"/>
-                <a:tab pos="4492440" algn="l"/>
-                <a:tab pos="4941719" algn="l"/>
-                <a:tab pos="5391000" algn="l"/>
-                <a:tab pos="5840280" algn="l"/>
-                <a:tab pos="6289560" algn="l"/>
-                <a:tab pos="6738840" algn="l"/>
-                <a:tab pos="7188120" algn="l"/>
-                <a:tab pos="7637400" algn="l"/>
-                <a:tab pos="8086679" algn="l"/>
-                <a:tab pos="8535960" algn="l"/>
-                <a:tab pos="8985240" algn="l"/>
-              </a:tabLst>
-              <a:defRPr/>
-            </a:pPr>
-            <a:fld id="{139AB42B-03F8-4530-82D6-B5FE47A70306}" type="slidenum">
-              <a:rPr kumimoji="0" lang="en-US" sz="1400" b="0" i="0" u="none" strike="noStrike" kern="1200" cap="none" spc="0" normalizeH="0" baseline="0" noProof="0" smtClean="0">
-                <a:ln>
-                  <a:noFill/>
-                </a:ln>
-                <a:solidFill>
-                  <a:srgbClr val="000000"/>
-                </a:solidFill>
-                <a:effectLst/>
-                <a:uLnTx/>
-                <a:uFillTx/>
-                <a:latin typeface="Times New Roman" pitchFamily="18"/>
-                <a:ea typeface="DejaVu Sans" pitchFamily="2"/>
-                <a:cs typeface="DejaVu Sans" pitchFamily="2"/>
-              </a:rPr>
-              <a:pPr marL="0" marR="0" lvl="0" indent="0" algn="r" defTabSz="914400" rtl="0" eaLnBrk="1" fontAlgn="auto" latinLnBrk="0" hangingPunct="0">
-                <a:lnSpc>
-                  <a:spcPct val="93000"/>
-                </a:lnSpc>
-                <a:spcBef>
-                  <a:spcPts val="0"/>
-                </a:spcBef>
-                <a:spcAft>
-                  <a:spcPts val="0"/>
-                </a:spcAft>
-                <a:buClrTx/>
-                <a:buSzTx/>
-                <a:buFontTx/>
-                <a:buNone/>
-                <a:tabLst>
-                  <a:tab pos="0" algn="l"/>
-                  <a:tab pos="448919" algn="l"/>
-                  <a:tab pos="898199" algn="l"/>
-                  <a:tab pos="1347480" algn="l"/>
-                  <a:tab pos="1796760" algn="l"/>
-                  <a:tab pos="2246040" algn="l"/>
-                  <a:tab pos="2695320" algn="l"/>
-                  <a:tab pos="3144600" algn="l"/>
-                  <a:tab pos="3593880" algn="l"/>
-                  <a:tab pos="4043159" algn="l"/>
-                  <a:tab pos="4492440" algn="l"/>
-                  <a:tab pos="4941719" algn="l"/>
-                  <a:tab pos="5391000" algn="l"/>
-                  <a:tab pos="5840280" algn="l"/>
-                  <a:tab pos="6289560" algn="l"/>
-                  <a:tab pos="6738840" algn="l"/>
-                  <a:tab pos="7188120" algn="l"/>
-                  <a:tab pos="7637400" algn="l"/>
-                  <a:tab pos="8086679" algn="l"/>
-                  <a:tab pos="8535960" algn="l"/>
-                  <a:tab pos="8985240" algn="l"/>
-                </a:tabLst>
-                <a:defRPr/>
-              </a:pPr>
-              <a:t>23</a:t>
-            </a:fld>
-            <a:endParaRPr kumimoji="0" lang="en-US" sz="1400" b="0" i="0" u="none" strike="noStrike" kern="1200" cap="none" spc="0" normalizeH="0" baseline="0" noProof="0">
-              <a:ln>
-                <a:noFill/>
-              </a:ln>
-              <a:solidFill>
-                <a:srgbClr val="000000"/>
-              </a:solidFill>
-              <a:effectLst/>
-              <a:uLnTx/>
-              <a:uFillTx/>
-              <a:latin typeface="Times New Roman" pitchFamily="18"/>
-              <a:ea typeface="DejaVu Sans" pitchFamily="2"/>
-              <a:cs typeface="DejaVu Sans" pitchFamily="2"/>
-            </a:endParaRPr>
-          </a:p>
-        </p:txBody>
-      </p:sp>
-      <p:sp>
-        <p:nvSpPr>
-          <p:cNvPr id="2" name="Slide Image Placeholder 1"/>
-          <p:cNvSpPr>
-            <a:spLocks noGrp="1" noRot="1" noChangeAspect="1" noResize="1"/>
-          </p:cNvSpPr>
-          <p:nvPr>
-            <p:ph type="sldImg"/>
-          </p:nvPr>
-        </p:nvSpPr>
-        <p:spPr>
-          <a:xfrm>
-            <a:off x="922338" y="752475"/>
-            <a:ext cx="4946650" cy="3711575"/>
-          </a:xfrm>
-          <a:solidFill>
-            <a:srgbClr val="729FCF"/>
-          </a:solidFill>
-          <a:ln w="25400">
-            <a:solidFill>
-              <a:srgbClr val="3465A4"/>
-            </a:solidFill>
-            <a:prstDash val="solid"/>
-          </a:ln>
-        </p:spPr>
-      </p:sp>
-      <p:sp>
-        <p:nvSpPr>
-          <p:cNvPr id="3" name="Notes Placeholder 2"/>
-          <p:cNvSpPr txBox="1">
-            <a:spLocks noGrp="1"/>
-          </p:cNvSpPr>
-          <p:nvPr>
-            <p:ph type="body" sz="quarter" idx="1"/>
-          </p:nvPr>
-        </p:nvSpPr>
-        <p:spPr>
-          <a:xfrm>
-            <a:off x="678960" y="4705200"/>
-            <a:ext cx="5434200" cy="4454640"/>
-          </a:xfrm>
-          <a:noFill/>
-          <a:ln>
-            <a:noFill/>
-          </a:ln>
-        </p:spPr>
-        <p:txBody>
-          <a:bodyPr lIns="0" tIns="0" rIns="0" bIns="0" compatLnSpc="1">
-            <a:spAutoFit/>
-          </a:bodyPr>
-          <a:lstStyle/>
-          <a:p>
-            <a:r>
-              <a:rPr lang="pt-PT" dirty="0" err="1" smtClean="0"/>
-              <a:t>https</a:t>
-            </a:r>
-            <a:r>
-              <a:rPr lang="pt-PT" dirty="0" smtClean="0"/>
-              <a:t>://</a:t>
-            </a:r>
-            <a:r>
-              <a:rPr lang="pt-PT" dirty="0" err="1" smtClean="0"/>
-              <a:t>www.drupal.org</a:t>
-            </a:r>
-            <a:r>
-              <a:rPr lang="pt-PT" dirty="0" smtClean="0"/>
-              <a:t>/training</a:t>
-            </a:r>
-            <a:endParaRPr lang="pt-PT" dirty="0"/>
-          </a:p>
-        </p:txBody>
-      </p:sp>
-    </p:spTree>
-    <p:extLst>
-      <p:ext uri="{BB962C8B-B14F-4D97-AF65-F5344CB8AC3E}">
-        <p14:creationId xmlns:p14="http://schemas.microsoft.com/office/powerpoint/2010/main" val="1363857728"/>
-      </p:ext>
-    </p:extLst>
-  </p:cSld>
-  <p:clrMapOvr>
-    <a:masterClrMapping/>
-  </p:clrMapOvr>
-</p:notes>
-</file>
-
-<file path=ppt/notesSlides/notesSlide23.xml><?xml version="1.0" encoding="utf-8"?>
-<p:notes xmlns:a="http://schemas.openxmlformats.org/drawingml/2006/main" xmlns:r="http://schemas.openxmlformats.org/officeDocument/2006/relationships" xmlns:p="http://schemas.openxmlformats.org/presentationml/2006/main">
-  <p:cSld>
-    <p:spTree>
-      <p:nvGrpSpPr>
-        <p:cNvPr id="1" name=""/>
-        <p:cNvGrpSpPr/>
-        <p:nvPr/>
-      </p:nvGrpSpPr>
-      <p:grpSpPr>
-        <a:xfrm>
-          <a:off x="0" y="0"/>
-          <a:ext cx="0" cy="0"/>
-          <a:chOff x="0" y="0"/>
-          <a:chExt cx="0" cy="0"/>
-        </a:xfrm>
-      </p:grpSpPr>
-      <p:sp>
-        <p:nvSpPr>
-          <p:cNvPr id="5" name="Date Placeholder 2"/>
-          <p:cNvSpPr txBox="1">
-            <a:spLocks noGrp="1"/>
-          </p:cNvSpPr>
-          <p:nvPr/>
-        </p:nvSpPr>
-        <p:spPr>
-          <a:xfrm>
-            <a:off x="3849688" y="0"/>
-            <a:ext cx="2944812" cy="496888"/>
-          </a:xfrm>
-          <a:prstGeom prst="rect">
-            <a:avLst/>
-          </a:prstGeom>
-          <a:noFill/>
-        </p:spPr>
-        <p:txBody>
-          <a:bodyPr vert="horz" lIns="91440" tIns="45720" rIns="91440" bIns="45720" rtlCol="0"/>
-          <a:lstStyle/>
-          <a:p>
-            <a:pPr marL="0" marR="0" lvl="0" indent="0" algn="r" defTabSz="914400" rtl="0" eaLnBrk="1" fontAlgn="auto" latinLnBrk="0" hangingPunct="1">
-              <a:lnSpc>
-                <a:spcPct val="100000"/>
-              </a:lnSpc>
-              <a:spcBef>
-                <a:spcPts val="0"/>
-              </a:spcBef>
-              <a:spcAft>
-                <a:spcPts val="0"/>
-              </a:spcAft>
-              <a:buClrTx/>
-              <a:buSzTx/>
-              <a:buFontTx/>
-              <a:buNone/>
-              <a:tabLst/>
-              <a:defRPr/>
-            </a:pPr>
-            <a:fld id="{FE739F03-1C0E-4075-8044-7DA246F923DA}" type="datetimeFigureOut">
-              <a:rPr kumimoji="0" lang="en-US" sz="1200" b="0" i="0" u="none" strike="noStrike" kern="1200" cap="none" spc="0" normalizeH="0" baseline="0" noProof="0" smtClean="0">
-                <a:ln>
-                  <a:noFill/>
-                </a:ln>
-                <a:solidFill>
-                  <a:schemeClr val="tx1"/>
-                </a:solidFill>
-                <a:effectLst/>
-                <a:uLnTx/>
-                <a:uFillTx/>
-                <a:latin typeface="+mn-lt"/>
-                <a:ea typeface="+mn-ea"/>
-                <a:cs typeface="+mn-cs"/>
-              </a:rPr>
-              <a:pPr marL="0" marR="0" lvl="0" indent="0" algn="r" defTabSz="914400" rtl="0" eaLnBrk="1" fontAlgn="auto" latinLnBrk="0" hangingPunct="1">
-                <a:lnSpc>
-                  <a:spcPct val="100000"/>
-                </a:lnSpc>
-                <a:spcBef>
-                  <a:spcPts val="0"/>
-                </a:spcBef>
-                <a:spcAft>
-                  <a:spcPts val="0"/>
-                </a:spcAft>
-                <a:buClrTx/>
-                <a:buSzTx/>
-                <a:buFontTx/>
-                <a:buNone/>
-                <a:tabLst/>
-                <a:defRPr/>
-              </a:pPr>
-              <a:t>11/11/17</a:t>
-            </a:fld>
-            <a:endParaRPr kumimoji="0" lang="en-US" sz="1200" b="0" i="0" u="none" strike="noStrike" kern="1200" cap="none" spc="0" normalizeH="0" baseline="0" noProof="0">
-              <a:ln>
-                <a:noFill/>
-              </a:ln>
-              <a:solidFill>
-                <a:schemeClr val="tx1"/>
-              </a:solidFill>
-              <a:effectLst/>
-              <a:uLnTx/>
-              <a:uFillTx/>
-              <a:latin typeface="+mn-lt"/>
-              <a:ea typeface="+mn-ea"/>
-              <a:cs typeface="+mn-cs"/>
-            </a:endParaRPr>
-          </a:p>
-        </p:txBody>
-      </p:sp>
-      <p:sp>
-        <p:nvSpPr>
-          <p:cNvPr id="6" name="Slide Number Placeholder 14"/>
-          <p:cNvSpPr txBox="1">
-            <a:spLocks noGrp="1"/>
-          </p:cNvSpPr>
-          <p:nvPr/>
-        </p:nvSpPr>
-        <p:spPr>
-          <a:xfrm>
-            <a:off x="3846600" y="9411840"/>
-            <a:ext cx="2946239" cy="492120"/>
-          </a:xfrm>
-          <a:prstGeom prst="rect">
-            <a:avLst/>
-          </a:prstGeom>
-          <a:noFill/>
-          <a:ln/>
-        </p:spPr>
-        <p:txBody>
-          <a:bodyPr vert="horz" wrap="square" lIns="0" tIns="0" rIns="0" bIns="0" anchor="b" anchorCtr="0" compatLnSpc="1">
-            <a:noAutofit/>
-          </a:bodyPr>
-          <a:lstStyle/>
-          <a:p>
-            <a:pPr marL="0" marR="0" lvl="0" indent="0" algn="r" defTabSz="914400" rtl="0" eaLnBrk="1" fontAlgn="auto" latinLnBrk="0" hangingPunct="0">
-              <a:lnSpc>
-                <a:spcPct val="93000"/>
-              </a:lnSpc>
-              <a:spcBef>
-                <a:spcPts val="0"/>
-              </a:spcBef>
-              <a:spcAft>
-                <a:spcPts val="0"/>
-              </a:spcAft>
-              <a:buClrTx/>
-              <a:buSzTx/>
-              <a:buFontTx/>
-              <a:buNone/>
-              <a:tabLst>
-                <a:tab pos="0" algn="l"/>
-                <a:tab pos="448919" algn="l"/>
-                <a:tab pos="898199" algn="l"/>
-                <a:tab pos="1347480" algn="l"/>
-                <a:tab pos="1796760" algn="l"/>
-                <a:tab pos="2246040" algn="l"/>
-                <a:tab pos="2695320" algn="l"/>
-                <a:tab pos="3144600" algn="l"/>
-                <a:tab pos="3593880" algn="l"/>
-                <a:tab pos="4043159" algn="l"/>
-                <a:tab pos="4492440" algn="l"/>
-                <a:tab pos="4941719" algn="l"/>
-                <a:tab pos="5391000" algn="l"/>
-                <a:tab pos="5840280" algn="l"/>
-                <a:tab pos="6289560" algn="l"/>
-                <a:tab pos="6738840" algn="l"/>
-                <a:tab pos="7188120" algn="l"/>
-                <a:tab pos="7637400" algn="l"/>
-                <a:tab pos="8086679" algn="l"/>
-                <a:tab pos="8535960" algn="l"/>
-                <a:tab pos="8985240" algn="l"/>
-              </a:tabLst>
-              <a:defRPr/>
-            </a:pPr>
-            <a:fld id="{CEF114DB-A5A8-41EC-B45D-1BE7E521F0EC}" type="slidenum">
-              <a:rPr kumimoji="0" lang="pt-PT" sz="1400" b="0" i="0" u="none" strike="noStrike" kern="1200" cap="none" spc="0" normalizeH="0" baseline="0" noProof="0" smtClean="0">
-                <a:ln>
-                  <a:noFill/>
-                </a:ln>
-                <a:solidFill>
-                  <a:srgbClr val="000000"/>
-                </a:solidFill>
-                <a:effectLst/>
-                <a:uLnTx/>
-                <a:uFillTx/>
-                <a:latin typeface="Times New Roman" pitchFamily="18"/>
-                <a:ea typeface="DejaVu Sans" pitchFamily="2"/>
-                <a:cs typeface="DejaVu Sans" pitchFamily="2"/>
-              </a:rPr>
-              <a:pPr marL="0" marR="0" lvl="0" indent="0" algn="r" defTabSz="914400" rtl="0" eaLnBrk="1" fontAlgn="auto" latinLnBrk="0" hangingPunct="0">
-                <a:lnSpc>
-                  <a:spcPct val="93000"/>
-                </a:lnSpc>
-                <a:spcBef>
-                  <a:spcPts val="0"/>
-                </a:spcBef>
-                <a:spcAft>
-                  <a:spcPts val="0"/>
-                </a:spcAft>
-                <a:buClrTx/>
-                <a:buSzTx/>
-                <a:buFontTx/>
-                <a:buNone/>
-                <a:tabLst>
-                  <a:tab pos="0" algn="l"/>
-                  <a:tab pos="448919" algn="l"/>
-                  <a:tab pos="898199" algn="l"/>
-                  <a:tab pos="1347480" algn="l"/>
-                  <a:tab pos="1796760" algn="l"/>
-                  <a:tab pos="2246040" algn="l"/>
-                  <a:tab pos="2695320" algn="l"/>
-                  <a:tab pos="3144600" algn="l"/>
-                  <a:tab pos="3593880" algn="l"/>
-                  <a:tab pos="4043159" algn="l"/>
-                  <a:tab pos="4492440" algn="l"/>
-                  <a:tab pos="4941719" algn="l"/>
-                  <a:tab pos="5391000" algn="l"/>
-                  <a:tab pos="5840280" algn="l"/>
-                  <a:tab pos="6289560" algn="l"/>
-                  <a:tab pos="6738840" algn="l"/>
-                  <a:tab pos="7188120" algn="l"/>
-                  <a:tab pos="7637400" algn="l"/>
-                  <a:tab pos="8086679" algn="l"/>
-                  <a:tab pos="8535960" algn="l"/>
-                  <a:tab pos="8985240" algn="l"/>
-                </a:tabLst>
-                <a:defRPr/>
-              </a:pPr>
               <a:t>24</a:t>
             </a:fld>
             <a:endParaRPr kumimoji="0" lang="pt-PT" sz="1400" b="0" i="0" u="none" strike="noStrike" kern="1200" cap="none" spc="0" normalizeH="0" baseline="0" noProof="0">
@@ -9364,14 +8900,14 @@
           </a:bodyPr>
           <a:lstStyle/>
           <a:p>
-            <a:endParaRPr lang="pt-PT"/>
+            <a:endParaRPr lang="pt-PT" dirty="0"/>
           </a:p>
         </p:txBody>
       </p:sp>
     </p:spTree>
     <p:extLst>
       <p:ext uri="{BB962C8B-B14F-4D97-AF65-F5344CB8AC3E}">
-        <p14:creationId xmlns:p14="http://schemas.microsoft.com/office/powerpoint/2010/main" val="1317585198"/>
+        <p14:creationId xmlns:p14="http://schemas.microsoft.com/office/powerpoint/2010/main" val="1647867200"/>
       </p:ext>
     </p:extLst>
   </p:cSld>
@@ -9381,7 +8917,7 @@
 </p:notes>
 </file>
 
-<file path=ppt/notesSlides/notesSlide24.xml><?xml version="1.0" encoding="utf-8"?>
+<file path=ppt/notesSlides/notesSlide23.xml><?xml version="1.0" encoding="utf-8"?>
 <p:notes xmlns:a="http://schemas.openxmlformats.org/drawingml/2006/main" xmlns:r="http://schemas.openxmlformats.org/officeDocument/2006/relationships" xmlns:p="http://schemas.openxmlformats.org/presentationml/2006/main">
   <p:cSld>
     <p:spTree>
@@ -9400,86 +8936,444 @@
       </p:grpSpPr>
       <p:sp>
         <p:nvSpPr>
+          <p:cNvPr id="5" name="Date Placeholder 2"/>
+          <p:cNvSpPr txBox="1">
+            <a:spLocks noGrp="1"/>
+          </p:cNvSpPr>
+          <p:nvPr/>
+        </p:nvSpPr>
+        <p:spPr>
+          <a:xfrm>
+            <a:off x="3849688" y="0"/>
+            <a:ext cx="2944812" cy="496888"/>
+          </a:xfrm>
+          <a:prstGeom prst="rect">
+            <a:avLst/>
+          </a:prstGeom>
+          <a:noFill/>
+        </p:spPr>
+        <p:txBody>
+          <a:bodyPr vert="horz" lIns="91440" tIns="45720" rIns="91440" bIns="45720" rtlCol="0"/>
+          <a:lstStyle/>
+          <a:p>
+            <a:pPr marL="0" marR="0" lvl="0" indent="0" algn="r" defTabSz="914400" rtl="0" eaLnBrk="1" fontAlgn="auto" latinLnBrk="0" hangingPunct="1">
+              <a:lnSpc>
+                <a:spcPct val="100000"/>
+              </a:lnSpc>
+              <a:spcBef>
+                <a:spcPts val="0"/>
+              </a:spcBef>
+              <a:spcAft>
+                <a:spcPts val="0"/>
+              </a:spcAft>
+              <a:buClrTx/>
+              <a:buSzTx/>
+              <a:buFontTx/>
+              <a:buNone/>
+              <a:tabLst/>
+              <a:defRPr/>
+            </a:pPr>
+            <a:fld id="{FE739F03-1C0E-4075-8044-7DA246F923DA}" type="datetimeFigureOut">
+              <a:rPr kumimoji="0" lang="en-US" sz="1200" b="0" i="0" u="none" strike="noStrike" kern="1200" cap="none" spc="0" normalizeH="0" baseline="0" noProof="0" smtClean="0">
+                <a:ln>
+                  <a:noFill/>
+                </a:ln>
+                <a:solidFill>
+                  <a:schemeClr val="tx1"/>
+                </a:solidFill>
+                <a:effectLst/>
+                <a:uLnTx/>
+                <a:uFillTx/>
+                <a:latin typeface="+mn-lt"/>
+                <a:ea typeface="+mn-ea"/>
+                <a:cs typeface="+mn-cs"/>
+              </a:rPr>
+              <a:pPr marL="0" marR="0" lvl="0" indent="0" algn="r" defTabSz="914400" rtl="0" eaLnBrk="1" fontAlgn="auto" latinLnBrk="0" hangingPunct="1">
+                <a:lnSpc>
+                  <a:spcPct val="100000"/>
+                </a:lnSpc>
+                <a:spcBef>
+                  <a:spcPts val="0"/>
+                </a:spcBef>
+                <a:spcAft>
+                  <a:spcPts val="0"/>
+                </a:spcAft>
+                <a:buClrTx/>
+                <a:buSzTx/>
+                <a:buFontTx/>
+                <a:buNone/>
+                <a:tabLst/>
+                <a:defRPr/>
+              </a:pPr>
+              <a:t>11/11/17</a:t>
+            </a:fld>
+            <a:endParaRPr kumimoji="0" lang="en-US" sz="1200" b="0" i="0" u="none" strike="noStrike" kern="1200" cap="none" spc="0" normalizeH="0" baseline="0" noProof="0">
+              <a:ln>
+                <a:noFill/>
+              </a:ln>
+              <a:solidFill>
+                <a:schemeClr val="tx1"/>
+              </a:solidFill>
+              <a:effectLst/>
+              <a:uLnTx/>
+              <a:uFillTx/>
+              <a:latin typeface="+mn-lt"/>
+              <a:ea typeface="+mn-ea"/>
+              <a:cs typeface="+mn-cs"/>
+            </a:endParaRPr>
+          </a:p>
+        </p:txBody>
+      </p:sp>
+      <p:sp>
+        <p:nvSpPr>
+          <p:cNvPr id="6" name="Slide Number Placeholder 14"/>
+          <p:cNvSpPr txBox="1">
+            <a:spLocks noGrp="1"/>
+          </p:cNvSpPr>
+          <p:nvPr/>
+        </p:nvSpPr>
+        <p:spPr>
+          <a:xfrm>
+            <a:off x="3846600" y="9411840"/>
+            <a:ext cx="2946239" cy="492120"/>
+          </a:xfrm>
+          <a:prstGeom prst="rect">
+            <a:avLst/>
+          </a:prstGeom>
+          <a:noFill/>
+          <a:ln/>
+        </p:spPr>
+        <p:txBody>
+          <a:bodyPr vert="horz" wrap="square" lIns="0" tIns="0" rIns="0" bIns="0" anchor="b" anchorCtr="0" compatLnSpc="1">
+            <a:noAutofit/>
+          </a:bodyPr>
+          <a:lstStyle/>
+          <a:p>
+            <a:pPr marL="0" marR="0" lvl="0" indent="0" algn="r" defTabSz="914400" rtl="0" eaLnBrk="1" fontAlgn="auto" latinLnBrk="0" hangingPunct="0">
+              <a:lnSpc>
+                <a:spcPct val="93000"/>
+              </a:lnSpc>
+              <a:spcBef>
+                <a:spcPts val="0"/>
+              </a:spcBef>
+              <a:spcAft>
+                <a:spcPts val="0"/>
+              </a:spcAft>
+              <a:buClrTx/>
+              <a:buSzTx/>
+              <a:buFontTx/>
+              <a:buNone/>
+              <a:tabLst>
+                <a:tab pos="0" algn="l"/>
+                <a:tab pos="448919" algn="l"/>
+                <a:tab pos="898199" algn="l"/>
+                <a:tab pos="1347480" algn="l"/>
+                <a:tab pos="1796760" algn="l"/>
+                <a:tab pos="2246040" algn="l"/>
+                <a:tab pos="2695320" algn="l"/>
+                <a:tab pos="3144600" algn="l"/>
+                <a:tab pos="3593880" algn="l"/>
+                <a:tab pos="4043159" algn="l"/>
+                <a:tab pos="4492440" algn="l"/>
+                <a:tab pos="4941719" algn="l"/>
+                <a:tab pos="5391000" algn="l"/>
+                <a:tab pos="5840280" algn="l"/>
+                <a:tab pos="6289560" algn="l"/>
+                <a:tab pos="6738840" algn="l"/>
+                <a:tab pos="7188120" algn="l"/>
+                <a:tab pos="7637400" algn="l"/>
+                <a:tab pos="8086679" algn="l"/>
+                <a:tab pos="8535960" algn="l"/>
+                <a:tab pos="8985240" algn="l"/>
+              </a:tabLst>
+              <a:defRPr/>
+            </a:pPr>
+            <a:fld id="{CEF114DB-A5A8-41EC-B45D-1BE7E521F0EC}" type="slidenum">
+              <a:rPr kumimoji="0" lang="pt-PT" sz="1400" b="0" i="0" u="none" strike="noStrike" kern="1200" cap="none" spc="0" normalizeH="0" baseline="0" noProof="0" smtClean="0">
+                <a:ln>
+                  <a:noFill/>
+                </a:ln>
+                <a:solidFill>
+                  <a:srgbClr val="000000"/>
+                </a:solidFill>
+                <a:effectLst/>
+                <a:uLnTx/>
+                <a:uFillTx/>
+                <a:latin typeface="Times New Roman" pitchFamily="18"/>
+                <a:ea typeface="DejaVu Sans" pitchFamily="2"/>
+                <a:cs typeface="DejaVu Sans" pitchFamily="2"/>
+              </a:rPr>
+              <a:pPr marL="0" marR="0" lvl="0" indent="0" algn="r" defTabSz="914400" rtl="0" eaLnBrk="1" fontAlgn="auto" latinLnBrk="0" hangingPunct="0">
+                <a:lnSpc>
+                  <a:spcPct val="93000"/>
+                </a:lnSpc>
+                <a:spcBef>
+                  <a:spcPts val="0"/>
+                </a:spcBef>
+                <a:spcAft>
+                  <a:spcPts val="0"/>
+                </a:spcAft>
+                <a:buClrTx/>
+                <a:buSzTx/>
+                <a:buFontTx/>
+                <a:buNone/>
+                <a:tabLst>
+                  <a:tab pos="0" algn="l"/>
+                  <a:tab pos="448919" algn="l"/>
+                  <a:tab pos="898199" algn="l"/>
+                  <a:tab pos="1347480" algn="l"/>
+                  <a:tab pos="1796760" algn="l"/>
+                  <a:tab pos="2246040" algn="l"/>
+                  <a:tab pos="2695320" algn="l"/>
+                  <a:tab pos="3144600" algn="l"/>
+                  <a:tab pos="3593880" algn="l"/>
+                  <a:tab pos="4043159" algn="l"/>
+                  <a:tab pos="4492440" algn="l"/>
+                  <a:tab pos="4941719" algn="l"/>
+                  <a:tab pos="5391000" algn="l"/>
+                  <a:tab pos="5840280" algn="l"/>
+                  <a:tab pos="6289560" algn="l"/>
+                  <a:tab pos="6738840" algn="l"/>
+                  <a:tab pos="7188120" algn="l"/>
+                  <a:tab pos="7637400" algn="l"/>
+                  <a:tab pos="8086679" algn="l"/>
+                  <a:tab pos="8535960" algn="l"/>
+                  <a:tab pos="8985240" algn="l"/>
+                </a:tabLst>
+                <a:defRPr/>
+              </a:pPr>
+              <a:t>25</a:t>
+            </a:fld>
+            <a:endParaRPr kumimoji="0" lang="pt-PT" sz="1400" b="0" i="0" u="none" strike="noStrike" kern="1200" cap="none" spc="0" normalizeH="0" baseline="0" noProof="0">
+              <a:ln>
+                <a:noFill/>
+              </a:ln>
+              <a:solidFill>
+                <a:srgbClr val="000000"/>
+              </a:solidFill>
+              <a:effectLst/>
+              <a:uLnTx/>
+              <a:uFillTx/>
+              <a:latin typeface="Times New Roman" pitchFamily="18"/>
+              <a:ea typeface="DejaVu Sans" pitchFamily="2"/>
+              <a:cs typeface="DejaVu Sans" pitchFamily="2"/>
+            </a:endParaRPr>
+          </a:p>
+        </p:txBody>
+      </p:sp>
+      <p:sp>
+        <p:nvSpPr>
+          <p:cNvPr id="8" name="Slide Number Placeholder 6"/>
+          <p:cNvSpPr txBox="1">
+            <a:spLocks noGrp="1"/>
+          </p:cNvSpPr>
+          <p:nvPr/>
+        </p:nvSpPr>
+        <p:spPr>
+          <a:xfrm>
+            <a:off x="3846600" y="9411840"/>
+            <a:ext cx="2946239" cy="492120"/>
+          </a:xfrm>
+          <a:prstGeom prst="rect">
+            <a:avLst/>
+          </a:prstGeom>
+          <a:noFill/>
+          <a:ln/>
+        </p:spPr>
+        <p:txBody>
+          <a:bodyPr vert="horz" wrap="square" lIns="91440" tIns="45720" rIns="91440" bIns="45720" rtlCol="0" anchor="b" anchorCtr="0" compatLnSpc="1">
+            <a:noAutofit/>
+          </a:bodyPr>
+          <a:lstStyle/>
+          <a:p>
+            <a:pPr marL="0" marR="0" lvl="0" indent="0" algn="r" defTabSz="914400" rtl="0" eaLnBrk="1" fontAlgn="auto" latinLnBrk="0" hangingPunct="0">
+              <a:lnSpc>
+                <a:spcPct val="93000"/>
+              </a:lnSpc>
+              <a:spcBef>
+                <a:spcPts val="0"/>
+              </a:spcBef>
+              <a:spcAft>
+                <a:spcPts val="0"/>
+              </a:spcAft>
+              <a:buClrTx/>
+              <a:buSzTx/>
+              <a:buFontTx/>
+              <a:buNone/>
+              <a:tabLst>
+                <a:tab pos="0" algn="l"/>
+                <a:tab pos="448919" algn="l"/>
+                <a:tab pos="898199" algn="l"/>
+                <a:tab pos="1347480" algn="l"/>
+                <a:tab pos="1796760" algn="l"/>
+                <a:tab pos="2246040" algn="l"/>
+                <a:tab pos="2695320" algn="l"/>
+                <a:tab pos="3144600" algn="l"/>
+                <a:tab pos="3593880" algn="l"/>
+                <a:tab pos="4043159" algn="l"/>
+                <a:tab pos="4492440" algn="l"/>
+                <a:tab pos="4941719" algn="l"/>
+                <a:tab pos="5391000" algn="l"/>
+                <a:tab pos="5840280" algn="l"/>
+                <a:tab pos="6289560" algn="l"/>
+                <a:tab pos="6738840" algn="l"/>
+                <a:tab pos="7188120" algn="l"/>
+                <a:tab pos="7637400" algn="l"/>
+                <a:tab pos="8086679" algn="l"/>
+                <a:tab pos="8535960" algn="l"/>
+                <a:tab pos="8985240" algn="l"/>
+              </a:tabLst>
+              <a:defRPr/>
+            </a:pPr>
+            <a:fld id="{139AB42B-03F8-4530-82D6-B5FE47A70306}" type="slidenum">
+              <a:rPr kumimoji="0" lang="en-US" sz="1400" b="0" i="0" u="none" strike="noStrike" kern="1200" cap="none" spc="0" normalizeH="0" baseline="0" noProof="0" smtClean="0">
+                <a:ln>
+                  <a:noFill/>
+                </a:ln>
+                <a:solidFill>
+                  <a:srgbClr val="000000"/>
+                </a:solidFill>
+                <a:effectLst/>
+                <a:uLnTx/>
+                <a:uFillTx/>
+                <a:latin typeface="Times New Roman" pitchFamily="18"/>
+                <a:ea typeface="DejaVu Sans" pitchFamily="2"/>
+                <a:cs typeface="DejaVu Sans" pitchFamily="2"/>
+              </a:rPr>
+              <a:pPr marL="0" marR="0" lvl="0" indent="0" algn="r" defTabSz="914400" rtl="0" eaLnBrk="1" fontAlgn="auto" latinLnBrk="0" hangingPunct="0">
+                <a:lnSpc>
+                  <a:spcPct val="93000"/>
+                </a:lnSpc>
+                <a:spcBef>
+                  <a:spcPts val="0"/>
+                </a:spcBef>
+                <a:spcAft>
+                  <a:spcPts val="0"/>
+                </a:spcAft>
+                <a:buClrTx/>
+                <a:buSzTx/>
+                <a:buFontTx/>
+                <a:buNone/>
+                <a:tabLst>
+                  <a:tab pos="0" algn="l"/>
+                  <a:tab pos="448919" algn="l"/>
+                  <a:tab pos="898199" algn="l"/>
+                  <a:tab pos="1347480" algn="l"/>
+                  <a:tab pos="1796760" algn="l"/>
+                  <a:tab pos="2246040" algn="l"/>
+                  <a:tab pos="2695320" algn="l"/>
+                  <a:tab pos="3144600" algn="l"/>
+                  <a:tab pos="3593880" algn="l"/>
+                  <a:tab pos="4043159" algn="l"/>
+                  <a:tab pos="4492440" algn="l"/>
+                  <a:tab pos="4941719" algn="l"/>
+                  <a:tab pos="5391000" algn="l"/>
+                  <a:tab pos="5840280" algn="l"/>
+                  <a:tab pos="6289560" algn="l"/>
+                  <a:tab pos="6738840" algn="l"/>
+                  <a:tab pos="7188120" algn="l"/>
+                  <a:tab pos="7637400" algn="l"/>
+                  <a:tab pos="8086679" algn="l"/>
+                  <a:tab pos="8535960" algn="l"/>
+                  <a:tab pos="8985240" algn="l"/>
+                </a:tabLst>
+                <a:defRPr/>
+              </a:pPr>
+              <a:t>25</a:t>
+            </a:fld>
+            <a:endParaRPr kumimoji="0" lang="en-US" sz="1400" b="0" i="0" u="none" strike="noStrike" kern="1200" cap="none" spc="0" normalizeH="0" baseline="0" noProof="0">
+              <a:ln>
+                <a:noFill/>
+              </a:ln>
+              <a:solidFill>
+                <a:srgbClr val="000000"/>
+              </a:solidFill>
+              <a:effectLst/>
+              <a:uLnTx/>
+              <a:uFillTx/>
+              <a:latin typeface="Times New Roman" pitchFamily="18"/>
+              <a:ea typeface="DejaVu Sans" pitchFamily="2"/>
+              <a:cs typeface="DejaVu Sans" pitchFamily="2"/>
+            </a:endParaRPr>
+          </a:p>
+        </p:txBody>
+      </p:sp>
+      <p:sp>
+        <p:nvSpPr>
           <p:cNvPr id="2" name="Slide Image Placeholder 1"/>
           <p:cNvSpPr>
-            <a:spLocks noGrp="1" noRot="1" noChangeAspect="1"/>
+            <a:spLocks noGrp="1" noRot="1" noChangeAspect="1" noResize="1"/>
           </p:cNvSpPr>
           <p:nvPr>
             <p:ph type="sldImg"/>
           </p:nvPr>
         </p:nvSpPr>
-        <p:spPr/>
+        <p:spPr>
+          <a:xfrm>
+            <a:off x="922338" y="752475"/>
+            <a:ext cx="4946650" cy="3711575"/>
+          </a:xfrm>
+          <a:solidFill>
+            <a:srgbClr val="729FCF"/>
+          </a:solidFill>
+          <a:ln w="25400">
+            <a:solidFill>
+              <a:srgbClr val="3465A4"/>
+            </a:solidFill>
+            <a:prstDash val="solid"/>
+          </a:ln>
+        </p:spPr>
       </p:sp>
       <p:sp>
         <p:nvSpPr>
           <p:cNvPr id="3" name="Notes Placeholder 2"/>
-          <p:cNvSpPr>
+          <p:cNvSpPr txBox="1">
             <a:spLocks noGrp="1"/>
           </p:cNvSpPr>
           <p:nvPr>
-            <p:ph type="body" idx="1"/>
+            <p:ph type="body" sz="quarter" idx="1"/>
           </p:nvPr>
         </p:nvSpPr>
-        <p:spPr/>
+        <p:spPr>
+          <a:xfrm>
+            <a:off x="678960" y="4705200"/>
+            <a:ext cx="5434200" cy="4454640"/>
+          </a:xfrm>
+          <a:noFill/>
+          <a:ln>
+            <a:noFill/>
+          </a:ln>
+        </p:spPr>
         <p:txBody>
-          <a:bodyPr/>
+          <a:bodyPr lIns="0" tIns="0" rIns="0" bIns="0" compatLnSpc="1">
+            <a:spAutoFit/>
+          </a:bodyPr>
           <a:lstStyle/>
           <a:p>
-            <a:endParaRPr lang="en-US" dirty="0"/>
-          </a:p>
-        </p:txBody>
-      </p:sp>
-      <p:sp>
-        <p:nvSpPr>
-          <p:cNvPr id="4" name="Slide Number Placeholder 3"/>
-          <p:cNvSpPr>
-            <a:spLocks noGrp="1"/>
-          </p:cNvSpPr>
-          <p:nvPr>
-            <p:ph type="sldNum" sz="quarter" idx="10"/>
-          </p:nvPr>
-        </p:nvSpPr>
-        <p:spPr/>
-        <p:txBody>
-          <a:bodyPr/>
-          <a:lstStyle/>
-          <a:p>
-            <a:pPr lvl="0"/>
-            <a:fld id="{D8293C68-4EBD-4E29-A77B-412D42891402}" type="slidenum">
-              <a:rPr lang="uk-UA" smtClean="0"/>
-              <a:t>25</a:t>
-            </a:fld>
-            <a:endParaRPr lang="uk-UA"/>
-          </a:p>
-        </p:txBody>
-      </p:sp>
-      <p:sp>
-        <p:nvSpPr>
-          <p:cNvPr id="5" name="Slide Number Placeholder 4"/>
-          <p:cNvSpPr>
-            <a:spLocks noGrp="1"/>
-          </p:cNvSpPr>
-          <p:nvPr>
-            <p:ph type="sldNum" sz="quarter" idx="11"/>
-          </p:nvPr>
-        </p:nvSpPr>
-        <p:spPr/>
-        <p:txBody>
-          <a:bodyPr/>
-          <a:lstStyle/>
-          <a:p>
-            <a:fld id="{A12B9A2B-C151-4C1C-B9B5-6883A09949A2}" type="slidenum">
-              <a:rPr lang="uk-UA" smtClean="0"/>
-              <a:t>25</a:t>
-            </a:fld>
-            <a:endParaRPr lang="uk-UA"/>
+            <a:r>
+              <a:rPr lang="pt-PT" dirty="0" err="1" smtClean="0"/>
+              <a:t>https</a:t>
+            </a:r>
+            <a:r>
+              <a:rPr lang="pt-PT" dirty="0" smtClean="0"/>
+              <a:t>://</a:t>
+            </a:r>
+            <a:r>
+              <a:rPr lang="pt-PT" dirty="0" err="1" smtClean="0"/>
+              <a:t>www.drupal.org</a:t>
+            </a:r>
+            <a:r>
+              <a:rPr lang="pt-PT" dirty="0" smtClean="0"/>
+              <a:t>/training</a:t>
+            </a:r>
+            <a:endParaRPr lang="pt-PT" dirty="0"/>
           </a:p>
         </p:txBody>
       </p:sp>
     </p:spTree>
     <p:extLst>
       <p:ext uri="{BB962C8B-B14F-4D97-AF65-F5344CB8AC3E}">
-        <p14:creationId xmlns:p14="http://schemas.microsoft.com/office/powerpoint/2010/main" val="660870755"/>
+        <p14:creationId xmlns:p14="http://schemas.microsoft.com/office/powerpoint/2010/main" val="1363857728"/>
       </p:ext>
     </p:extLst>
   </p:cSld>
@@ -9489,7 +9383,7 @@
 </p:notes>
 </file>
 
-<file path=ppt/notesSlides/notesSlide25.xml><?xml version="1.0" encoding="utf-8"?>
+<file path=ppt/notesSlides/notesSlide24.xml><?xml version="1.0" encoding="utf-8"?>
 <p:notes xmlns:a="http://schemas.openxmlformats.org/drawingml/2006/main" xmlns:r="http://schemas.openxmlformats.org/officeDocument/2006/relationships" xmlns:p="http://schemas.openxmlformats.org/presentationml/2006/main">
   <p:cSld>
     <p:spTree>
@@ -9929,7 +9823,7 @@
     </p:spTree>
     <p:extLst>
       <p:ext uri="{BB962C8B-B14F-4D97-AF65-F5344CB8AC3E}">
-        <p14:creationId xmlns:p14="http://schemas.microsoft.com/office/powerpoint/2010/main" val="1286776018"/>
+        <p14:creationId xmlns:p14="http://schemas.microsoft.com/office/powerpoint/2010/main" val="1317585198"/>
       </p:ext>
     </p:extLst>
   </p:cSld>
@@ -9939,7 +9833,7 @@
 </p:notes>
 </file>
 
-<file path=ppt/notesSlides/notesSlide26.xml><?xml version="1.0" encoding="utf-8"?>
+<file path=ppt/notesSlides/notesSlide25.xml><?xml version="1.0" encoding="utf-8"?>
 <p:notes xmlns:a="http://schemas.openxmlformats.org/drawingml/2006/main" xmlns:r="http://schemas.openxmlformats.org/officeDocument/2006/relationships" xmlns:p="http://schemas.openxmlformats.org/presentationml/2006/main">
   <p:cSld>
     <p:spTree>
@@ -9958,428 +9852,86 @@
       </p:grpSpPr>
       <p:sp>
         <p:nvSpPr>
-          <p:cNvPr id="5" name="Date Placeholder 2"/>
-          <p:cNvSpPr txBox="1">
-            <a:spLocks noGrp="1"/>
-          </p:cNvSpPr>
-          <p:nvPr/>
-        </p:nvSpPr>
-        <p:spPr>
-          <a:xfrm>
-            <a:off x="3849688" y="0"/>
-            <a:ext cx="2944812" cy="496888"/>
-          </a:xfrm>
-          <a:prstGeom prst="rect">
-            <a:avLst/>
-          </a:prstGeom>
-          <a:noFill/>
-        </p:spPr>
-        <p:txBody>
-          <a:bodyPr vert="horz" lIns="91440" tIns="45720" rIns="91440" bIns="45720" rtlCol="0"/>
-          <a:lstStyle/>
-          <a:p>
-            <a:pPr marL="0" marR="0" lvl="0" indent="0" algn="r" defTabSz="914400" rtl="0" eaLnBrk="1" fontAlgn="auto" latinLnBrk="0" hangingPunct="1">
-              <a:lnSpc>
-                <a:spcPct val="100000"/>
-              </a:lnSpc>
-              <a:spcBef>
-                <a:spcPts val="0"/>
-              </a:spcBef>
-              <a:spcAft>
-                <a:spcPts val="0"/>
-              </a:spcAft>
-              <a:buClrTx/>
-              <a:buSzTx/>
-              <a:buFontTx/>
-              <a:buNone/>
-              <a:tabLst/>
-              <a:defRPr/>
-            </a:pPr>
-            <a:fld id="{FE739F03-1C0E-4075-8044-7DA246F923DA}" type="datetimeFigureOut">
-              <a:rPr kumimoji="0" lang="en-US" sz="1200" b="0" i="0" u="none" strike="noStrike" kern="1200" cap="none" spc="0" normalizeH="0" baseline="0" noProof="0" smtClean="0">
-                <a:ln>
-                  <a:noFill/>
-                </a:ln>
-                <a:solidFill>
-                  <a:schemeClr val="tx1"/>
-                </a:solidFill>
-                <a:effectLst/>
-                <a:uLnTx/>
-                <a:uFillTx/>
-                <a:latin typeface="+mn-lt"/>
-                <a:ea typeface="+mn-ea"/>
-                <a:cs typeface="+mn-cs"/>
-              </a:rPr>
-              <a:pPr marL="0" marR="0" lvl="0" indent="0" algn="r" defTabSz="914400" rtl="0" eaLnBrk="1" fontAlgn="auto" latinLnBrk="0" hangingPunct="1">
-                <a:lnSpc>
-                  <a:spcPct val="100000"/>
-                </a:lnSpc>
-                <a:spcBef>
-                  <a:spcPts val="0"/>
-                </a:spcBef>
-                <a:spcAft>
-                  <a:spcPts val="0"/>
-                </a:spcAft>
-                <a:buClrTx/>
-                <a:buSzTx/>
-                <a:buFontTx/>
-                <a:buNone/>
-                <a:tabLst/>
-                <a:defRPr/>
-              </a:pPr>
-              <a:t>11/11/17</a:t>
-            </a:fld>
-            <a:endParaRPr kumimoji="0" lang="en-US" sz="1200" b="0" i="0" u="none" strike="noStrike" kern="1200" cap="none" spc="0" normalizeH="0" baseline="0" noProof="0">
-              <a:ln>
-                <a:noFill/>
-              </a:ln>
-              <a:solidFill>
-                <a:schemeClr val="tx1"/>
-              </a:solidFill>
-              <a:effectLst/>
-              <a:uLnTx/>
-              <a:uFillTx/>
-              <a:latin typeface="+mn-lt"/>
-              <a:ea typeface="+mn-ea"/>
-              <a:cs typeface="+mn-cs"/>
-            </a:endParaRPr>
-          </a:p>
-        </p:txBody>
-      </p:sp>
-      <p:sp>
-        <p:nvSpPr>
-          <p:cNvPr id="6" name="Slide Number Placeholder 14"/>
-          <p:cNvSpPr txBox="1">
-            <a:spLocks noGrp="1"/>
-          </p:cNvSpPr>
-          <p:nvPr/>
-        </p:nvSpPr>
-        <p:spPr>
-          <a:xfrm>
-            <a:off x="3846600" y="9411840"/>
-            <a:ext cx="2946239" cy="492120"/>
-          </a:xfrm>
-          <a:prstGeom prst="rect">
-            <a:avLst/>
-          </a:prstGeom>
-          <a:noFill/>
-          <a:ln/>
-        </p:spPr>
-        <p:txBody>
-          <a:bodyPr vert="horz" wrap="square" lIns="0" tIns="0" rIns="0" bIns="0" anchor="b" anchorCtr="0" compatLnSpc="1">
-            <a:noAutofit/>
-          </a:bodyPr>
-          <a:lstStyle/>
-          <a:p>
-            <a:pPr marL="0" marR="0" lvl="0" indent="0" algn="r" defTabSz="914400" rtl="0" eaLnBrk="1" fontAlgn="auto" latinLnBrk="0" hangingPunct="0">
-              <a:lnSpc>
-                <a:spcPct val="93000"/>
-              </a:lnSpc>
-              <a:spcBef>
-                <a:spcPts val="0"/>
-              </a:spcBef>
-              <a:spcAft>
-                <a:spcPts val="0"/>
-              </a:spcAft>
-              <a:buClrTx/>
-              <a:buSzTx/>
-              <a:buFontTx/>
-              <a:buNone/>
-              <a:tabLst>
-                <a:tab pos="0" algn="l"/>
-                <a:tab pos="448919" algn="l"/>
-                <a:tab pos="898199" algn="l"/>
-                <a:tab pos="1347480" algn="l"/>
-                <a:tab pos="1796760" algn="l"/>
-                <a:tab pos="2246040" algn="l"/>
-                <a:tab pos="2695320" algn="l"/>
-                <a:tab pos="3144600" algn="l"/>
-                <a:tab pos="3593880" algn="l"/>
-                <a:tab pos="4043159" algn="l"/>
-                <a:tab pos="4492440" algn="l"/>
-                <a:tab pos="4941719" algn="l"/>
-                <a:tab pos="5391000" algn="l"/>
-                <a:tab pos="5840280" algn="l"/>
-                <a:tab pos="6289560" algn="l"/>
-                <a:tab pos="6738840" algn="l"/>
-                <a:tab pos="7188120" algn="l"/>
-                <a:tab pos="7637400" algn="l"/>
-                <a:tab pos="8086679" algn="l"/>
-                <a:tab pos="8535960" algn="l"/>
-                <a:tab pos="8985240" algn="l"/>
-              </a:tabLst>
-              <a:defRPr/>
-            </a:pPr>
-            <a:fld id="{CEF114DB-A5A8-41EC-B45D-1BE7E521F0EC}" type="slidenum">
-              <a:rPr kumimoji="0" lang="pt-PT" sz="1400" b="0" i="0" u="none" strike="noStrike" kern="1200" cap="none" spc="0" normalizeH="0" baseline="0" noProof="0" smtClean="0">
-                <a:ln>
-                  <a:noFill/>
-                </a:ln>
-                <a:solidFill>
-                  <a:srgbClr val="000000"/>
-                </a:solidFill>
-                <a:effectLst/>
-                <a:uLnTx/>
-                <a:uFillTx/>
-                <a:latin typeface="Times New Roman" pitchFamily="18"/>
-                <a:ea typeface="DejaVu Sans" pitchFamily="2"/>
-                <a:cs typeface="DejaVu Sans" pitchFamily="2"/>
-              </a:rPr>
-              <a:pPr marL="0" marR="0" lvl="0" indent="0" algn="r" defTabSz="914400" rtl="0" eaLnBrk="1" fontAlgn="auto" latinLnBrk="0" hangingPunct="0">
-                <a:lnSpc>
-                  <a:spcPct val="93000"/>
-                </a:lnSpc>
-                <a:spcBef>
-                  <a:spcPts val="0"/>
-                </a:spcBef>
-                <a:spcAft>
-                  <a:spcPts val="0"/>
-                </a:spcAft>
-                <a:buClrTx/>
-                <a:buSzTx/>
-                <a:buFontTx/>
-                <a:buNone/>
-                <a:tabLst>
-                  <a:tab pos="0" algn="l"/>
-                  <a:tab pos="448919" algn="l"/>
-                  <a:tab pos="898199" algn="l"/>
-                  <a:tab pos="1347480" algn="l"/>
-                  <a:tab pos="1796760" algn="l"/>
-                  <a:tab pos="2246040" algn="l"/>
-                  <a:tab pos="2695320" algn="l"/>
-                  <a:tab pos="3144600" algn="l"/>
-                  <a:tab pos="3593880" algn="l"/>
-                  <a:tab pos="4043159" algn="l"/>
-                  <a:tab pos="4492440" algn="l"/>
-                  <a:tab pos="4941719" algn="l"/>
-                  <a:tab pos="5391000" algn="l"/>
-                  <a:tab pos="5840280" algn="l"/>
-                  <a:tab pos="6289560" algn="l"/>
-                  <a:tab pos="6738840" algn="l"/>
-                  <a:tab pos="7188120" algn="l"/>
-                  <a:tab pos="7637400" algn="l"/>
-                  <a:tab pos="8086679" algn="l"/>
-                  <a:tab pos="8535960" algn="l"/>
-                  <a:tab pos="8985240" algn="l"/>
-                </a:tabLst>
-                <a:defRPr/>
-              </a:pPr>
-              <a:t>27</a:t>
-            </a:fld>
-            <a:endParaRPr kumimoji="0" lang="pt-PT" sz="1400" b="0" i="0" u="none" strike="noStrike" kern="1200" cap="none" spc="0" normalizeH="0" baseline="0" noProof="0">
-              <a:ln>
-                <a:noFill/>
-              </a:ln>
-              <a:solidFill>
-                <a:srgbClr val="000000"/>
-              </a:solidFill>
-              <a:effectLst/>
-              <a:uLnTx/>
-              <a:uFillTx/>
-              <a:latin typeface="Times New Roman" pitchFamily="18"/>
-              <a:ea typeface="DejaVu Sans" pitchFamily="2"/>
-              <a:cs typeface="DejaVu Sans" pitchFamily="2"/>
-            </a:endParaRPr>
-          </a:p>
-        </p:txBody>
-      </p:sp>
-      <p:sp>
-        <p:nvSpPr>
-          <p:cNvPr id="8" name="Slide Number Placeholder 6"/>
-          <p:cNvSpPr txBox="1">
-            <a:spLocks noGrp="1"/>
-          </p:cNvSpPr>
-          <p:nvPr/>
-        </p:nvSpPr>
-        <p:spPr>
-          <a:xfrm>
-            <a:off x="3846600" y="9411840"/>
-            <a:ext cx="2946239" cy="492120"/>
-          </a:xfrm>
-          <a:prstGeom prst="rect">
-            <a:avLst/>
-          </a:prstGeom>
-          <a:noFill/>
-          <a:ln/>
-        </p:spPr>
-        <p:txBody>
-          <a:bodyPr vert="horz" wrap="square" lIns="91440" tIns="45720" rIns="91440" bIns="45720" rtlCol="0" anchor="b" anchorCtr="0" compatLnSpc="1">
-            <a:noAutofit/>
-          </a:bodyPr>
-          <a:lstStyle/>
-          <a:p>
-            <a:pPr marL="0" marR="0" lvl="0" indent="0" algn="r" defTabSz="914400" rtl="0" eaLnBrk="1" fontAlgn="auto" latinLnBrk="0" hangingPunct="0">
-              <a:lnSpc>
-                <a:spcPct val="93000"/>
-              </a:lnSpc>
-              <a:spcBef>
-                <a:spcPts val="0"/>
-              </a:spcBef>
-              <a:spcAft>
-                <a:spcPts val="0"/>
-              </a:spcAft>
-              <a:buClrTx/>
-              <a:buSzTx/>
-              <a:buFontTx/>
-              <a:buNone/>
-              <a:tabLst>
-                <a:tab pos="0" algn="l"/>
-                <a:tab pos="448919" algn="l"/>
-                <a:tab pos="898199" algn="l"/>
-                <a:tab pos="1347480" algn="l"/>
-                <a:tab pos="1796760" algn="l"/>
-                <a:tab pos="2246040" algn="l"/>
-                <a:tab pos="2695320" algn="l"/>
-                <a:tab pos="3144600" algn="l"/>
-                <a:tab pos="3593880" algn="l"/>
-                <a:tab pos="4043159" algn="l"/>
-                <a:tab pos="4492440" algn="l"/>
-                <a:tab pos="4941719" algn="l"/>
-                <a:tab pos="5391000" algn="l"/>
-                <a:tab pos="5840280" algn="l"/>
-                <a:tab pos="6289560" algn="l"/>
-                <a:tab pos="6738840" algn="l"/>
-                <a:tab pos="7188120" algn="l"/>
-                <a:tab pos="7637400" algn="l"/>
-                <a:tab pos="8086679" algn="l"/>
-                <a:tab pos="8535960" algn="l"/>
-                <a:tab pos="8985240" algn="l"/>
-              </a:tabLst>
-              <a:defRPr/>
-            </a:pPr>
-            <a:fld id="{139AB42B-03F8-4530-82D6-B5FE47A70306}" type="slidenum">
-              <a:rPr kumimoji="0" lang="en-US" sz="1400" b="0" i="0" u="none" strike="noStrike" kern="1200" cap="none" spc="0" normalizeH="0" baseline="0" noProof="0" smtClean="0">
-                <a:ln>
-                  <a:noFill/>
-                </a:ln>
-                <a:solidFill>
-                  <a:srgbClr val="000000"/>
-                </a:solidFill>
-                <a:effectLst/>
-                <a:uLnTx/>
-                <a:uFillTx/>
-                <a:latin typeface="Times New Roman" pitchFamily="18"/>
-                <a:ea typeface="DejaVu Sans" pitchFamily="2"/>
-                <a:cs typeface="DejaVu Sans" pitchFamily="2"/>
-              </a:rPr>
-              <a:pPr marL="0" marR="0" lvl="0" indent="0" algn="r" defTabSz="914400" rtl="0" eaLnBrk="1" fontAlgn="auto" latinLnBrk="0" hangingPunct="0">
-                <a:lnSpc>
-                  <a:spcPct val="93000"/>
-                </a:lnSpc>
-                <a:spcBef>
-                  <a:spcPts val="0"/>
-                </a:spcBef>
-                <a:spcAft>
-                  <a:spcPts val="0"/>
-                </a:spcAft>
-                <a:buClrTx/>
-                <a:buSzTx/>
-                <a:buFontTx/>
-                <a:buNone/>
-                <a:tabLst>
-                  <a:tab pos="0" algn="l"/>
-                  <a:tab pos="448919" algn="l"/>
-                  <a:tab pos="898199" algn="l"/>
-                  <a:tab pos="1347480" algn="l"/>
-                  <a:tab pos="1796760" algn="l"/>
-                  <a:tab pos="2246040" algn="l"/>
-                  <a:tab pos="2695320" algn="l"/>
-                  <a:tab pos="3144600" algn="l"/>
-                  <a:tab pos="3593880" algn="l"/>
-                  <a:tab pos="4043159" algn="l"/>
-                  <a:tab pos="4492440" algn="l"/>
-                  <a:tab pos="4941719" algn="l"/>
-                  <a:tab pos="5391000" algn="l"/>
-                  <a:tab pos="5840280" algn="l"/>
-                  <a:tab pos="6289560" algn="l"/>
-                  <a:tab pos="6738840" algn="l"/>
-                  <a:tab pos="7188120" algn="l"/>
-                  <a:tab pos="7637400" algn="l"/>
-                  <a:tab pos="8086679" algn="l"/>
-                  <a:tab pos="8535960" algn="l"/>
-                  <a:tab pos="8985240" algn="l"/>
-                </a:tabLst>
-                <a:defRPr/>
-              </a:pPr>
-              <a:t>27</a:t>
-            </a:fld>
-            <a:endParaRPr kumimoji="0" lang="en-US" sz="1400" b="0" i="0" u="none" strike="noStrike" kern="1200" cap="none" spc="0" normalizeH="0" baseline="0" noProof="0">
-              <a:ln>
-                <a:noFill/>
-              </a:ln>
-              <a:solidFill>
-                <a:srgbClr val="000000"/>
-              </a:solidFill>
-              <a:effectLst/>
-              <a:uLnTx/>
-              <a:uFillTx/>
-              <a:latin typeface="Times New Roman" pitchFamily="18"/>
-              <a:ea typeface="DejaVu Sans" pitchFamily="2"/>
-              <a:cs typeface="DejaVu Sans" pitchFamily="2"/>
-            </a:endParaRPr>
-          </a:p>
-        </p:txBody>
-      </p:sp>
-      <p:sp>
-        <p:nvSpPr>
           <p:cNvPr id="2" name="Slide Image Placeholder 1"/>
           <p:cNvSpPr>
-            <a:spLocks noGrp="1" noRot="1" noChangeAspect="1" noResize="1"/>
+            <a:spLocks noGrp="1" noRot="1" noChangeAspect="1"/>
           </p:cNvSpPr>
           <p:nvPr>
             <p:ph type="sldImg"/>
           </p:nvPr>
         </p:nvSpPr>
-        <p:spPr>
-          <a:xfrm>
-            <a:off x="922338" y="752475"/>
-            <a:ext cx="4946650" cy="3711575"/>
-          </a:xfrm>
-          <a:solidFill>
-            <a:srgbClr val="729FCF"/>
-          </a:solidFill>
-          <a:ln w="25400">
-            <a:solidFill>
-              <a:srgbClr val="3465A4"/>
-            </a:solidFill>
-            <a:prstDash val="solid"/>
-          </a:ln>
-        </p:spPr>
+        <p:spPr/>
       </p:sp>
       <p:sp>
         <p:nvSpPr>
           <p:cNvPr id="3" name="Notes Placeholder 2"/>
-          <p:cNvSpPr txBox="1">
+          <p:cNvSpPr>
             <a:spLocks noGrp="1"/>
           </p:cNvSpPr>
           <p:nvPr>
-            <p:ph type="body" sz="quarter" idx="1"/>
+            <p:ph type="body" idx="1"/>
           </p:nvPr>
         </p:nvSpPr>
-        <p:spPr>
-          <a:xfrm>
-            <a:off x="678960" y="4705200"/>
-            <a:ext cx="5434200" cy="4454640"/>
-          </a:xfrm>
-          <a:noFill/>
-          <a:ln>
-            <a:noFill/>
-          </a:ln>
-        </p:spPr>
+        <p:spPr/>
         <p:txBody>
-          <a:bodyPr lIns="0" tIns="0" rIns="0" bIns="0" compatLnSpc="1">
-            <a:spAutoFit/>
-          </a:bodyPr>
+          <a:bodyPr/>
           <a:lstStyle/>
           <a:p>
-            <a:endParaRPr lang="pt-PT"/>
+            <a:endParaRPr lang="en-US" dirty="0"/>
+          </a:p>
+        </p:txBody>
+      </p:sp>
+      <p:sp>
+        <p:nvSpPr>
+          <p:cNvPr id="4" name="Slide Number Placeholder 3"/>
+          <p:cNvSpPr>
+            <a:spLocks noGrp="1"/>
+          </p:cNvSpPr>
+          <p:nvPr>
+            <p:ph type="sldNum" sz="quarter" idx="10"/>
+          </p:nvPr>
+        </p:nvSpPr>
+        <p:spPr/>
+        <p:txBody>
+          <a:bodyPr/>
+          <a:lstStyle/>
+          <a:p>
+            <a:pPr lvl="0"/>
+            <a:fld id="{D8293C68-4EBD-4E29-A77B-412D42891402}" type="slidenum">
+              <a:rPr lang="uk-UA" smtClean="0"/>
+              <a:t>27</a:t>
+            </a:fld>
+            <a:endParaRPr lang="uk-UA"/>
+          </a:p>
+        </p:txBody>
+      </p:sp>
+      <p:sp>
+        <p:nvSpPr>
+          <p:cNvPr id="5" name="Slide Number Placeholder 4"/>
+          <p:cNvSpPr>
+            <a:spLocks noGrp="1"/>
+          </p:cNvSpPr>
+          <p:nvPr>
+            <p:ph type="sldNum" sz="quarter" idx="11"/>
+          </p:nvPr>
+        </p:nvSpPr>
+        <p:spPr/>
+        <p:txBody>
+          <a:bodyPr/>
+          <a:lstStyle/>
+          <a:p>
+            <a:fld id="{A12B9A2B-C151-4C1C-B9B5-6883A09949A2}" type="slidenum">
+              <a:rPr lang="uk-UA" smtClean="0"/>
+              <a:t>27</a:t>
+            </a:fld>
+            <a:endParaRPr lang="uk-UA"/>
           </a:p>
         </p:txBody>
       </p:sp>
     </p:spTree>
     <p:extLst>
       <p:ext uri="{BB962C8B-B14F-4D97-AF65-F5344CB8AC3E}">
-        <p14:creationId xmlns:p14="http://schemas.microsoft.com/office/powerpoint/2010/main" val="929807415"/>
+        <p14:creationId xmlns:p14="http://schemas.microsoft.com/office/powerpoint/2010/main" val="660870755"/>
       </p:ext>
     </p:extLst>
   </p:cSld>
@@ -10389,7 +9941,7 @@
 </p:notes>
 </file>
 
-<file path=ppt/notesSlides/notesSlide27.xml><?xml version="1.0" encoding="utf-8"?>
+<file path=ppt/notesSlides/notesSlide26.xml><?xml version="1.0" encoding="utf-8"?>
 <p:notes xmlns:a="http://schemas.openxmlformats.org/drawingml/2006/main" xmlns:r="http://schemas.openxmlformats.org/officeDocument/2006/relationships" xmlns:p="http://schemas.openxmlformats.org/presentationml/2006/main">
   <p:cSld>
     <p:spTree>
@@ -10829,7 +10381,7 @@
     </p:spTree>
     <p:extLst>
       <p:ext uri="{BB962C8B-B14F-4D97-AF65-F5344CB8AC3E}">
-        <p14:creationId xmlns:p14="http://schemas.microsoft.com/office/powerpoint/2010/main" val="522678345"/>
+        <p14:creationId xmlns:p14="http://schemas.microsoft.com/office/powerpoint/2010/main" val="1286776018"/>
       </p:ext>
     </p:extLst>
   </p:cSld>
@@ -10839,7 +10391,7 @@
 </p:notes>
 </file>
 
-<file path=ppt/notesSlides/notesSlide28.xml><?xml version="1.0" encoding="utf-8"?>
+<file path=ppt/notesSlides/notesSlide27.xml><?xml version="1.0" encoding="utf-8"?>
 <p:notes xmlns:a="http://schemas.openxmlformats.org/drawingml/2006/main" xmlns:r="http://schemas.openxmlformats.org/officeDocument/2006/relationships" xmlns:p="http://schemas.openxmlformats.org/presentationml/2006/main">
   <p:cSld>
     <p:spTree>
@@ -11202,6 +10754,906 @@
                 <a:defRPr/>
               </a:pPr>
               <a:t>29</a:t>
+            </a:fld>
+            <a:endParaRPr kumimoji="0" lang="en-US" sz="1400" b="0" i="0" u="none" strike="noStrike" kern="1200" cap="none" spc="0" normalizeH="0" baseline="0" noProof="0">
+              <a:ln>
+                <a:noFill/>
+              </a:ln>
+              <a:solidFill>
+                <a:srgbClr val="000000"/>
+              </a:solidFill>
+              <a:effectLst/>
+              <a:uLnTx/>
+              <a:uFillTx/>
+              <a:latin typeface="Times New Roman" pitchFamily="18"/>
+              <a:ea typeface="DejaVu Sans" pitchFamily="2"/>
+              <a:cs typeface="DejaVu Sans" pitchFamily="2"/>
+            </a:endParaRPr>
+          </a:p>
+        </p:txBody>
+      </p:sp>
+      <p:sp>
+        <p:nvSpPr>
+          <p:cNvPr id="2" name="Slide Image Placeholder 1"/>
+          <p:cNvSpPr>
+            <a:spLocks noGrp="1" noRot="1" noChangeAspect="1" noResize="1"/>
+          </p:cNvSpPr>
+          <p:nvPr>
+            <p:ph type="sldImg"/>
+          </p:nvPr>
+        </p:nvSpPr>
+        <p:spPr>
+          <a:xfrm>
+            <a:off x="922338" y="752475"/>
+            <a:ext cx="4946650" cy="3711575"/>
+          </a:xfrm>
+          <a:solidFill>
+            <a:srgbClr val="729FCF"/>
+          </a:solidFill>
+          <a:ln w="25400">
+            <a:solidFill>
+              <a:srgbClr val="3465A4"/>
+            </a:solidFill>
+            <a:prstDash val="solid"/>
+          </a:ln>
+        </p:spPr>
+      </p:sp>
+      <p:sp>
+        <p:nvSpPr>
+          <p:cNvPr id="3" name="Notes Placeholder 2"/>
+          <p:cNvSpPr txBox="1">
+            <a:spLocks noGrp="1"/>
+          </p:cNvSpPr>
+          <p:nvPr>
+            <p:ph type="body" sz="quarter" idx="1"/>
+          </p:nvPr>
+        </p:nvSpPr>
+        <p:spPr>
+          <a:xfrm>
+            <a:off x="678960" y="4705200"/>
+            <a:ext cx="5434200" cy="4454640"/>
+          </a:xfrm>
+          <a:noFill/>
+          <a:ln>
+            <a:noFill/>
+          </a:ln>
+        </p:spPr>
+        <p:txBody>
+          <a:bodyPr lIns="0" tIns="0" rIns="0" bIns="0" compatLnSpc="1">
+            <a:spAutoFit/>
+          </a:bodyPr>
+          <a:lstStyle/>
+          <a:p>
+            <a:endParaRPr lang="pt-PT"/>
+          </a:p>
+        </p:txBody>
+      </p:sp>
+    </p:spTree>
+    <p:extLst>
+      <p:ext uri="{BB962C8B-B14F-4D97-AF65-F5344CB8AC3E}">
+        <p14:creationId xmlns:p14="http://schemas.microsoft.com/office/powerpoint/2010/main" val="929807415"/>
+      </p:ext>
+    </p:extLst>
+  </p:cSld>
+  <p:clrMapOvr>
+    <a:masterClrMapping/>
+  </p:clrMapOvr>
+</p:notes>
+</file>
+
+<file path=ppt/notesSlides/notesSlide28.xml><?xml version="1.0" encoding="utf-8"?>
+<p:notes xmlns:a="http://schemas.openxmlformats.org/drawingml/2006/main" xmlns:r="http://schemas.openxmlformats.org/officeDocument/2006/relationships" xmlns:p="http://schemas.openxmlformats.org/presentationml/2006/main">
+  <p:cSld>
+    <p:spTree>
+      <p:nvGrpSpPr>
+        <p:cNvPr id="1" name=""/>
+        <p:cNvGrpSpPr/>
+        <p:nvPr/>
+      </p:nvGrpSpPr>
+      <p:grpSpPr>
+        <a:xfrm>
+          <a:off x="0" y="0"/>
+          <a:ext cx="0" cy="0"/>
+          <a:chOff x="0" y="0"/>
+          <a:chExt cx="0" cy="0"/>
+        </a:xfrm>
+      </p:grpSpPr>
+      <p:sp>
+        <p:nvSpPr>
+          <p:cNvPr id="5" name="Date Placeholder 2"/>
+          <p:cNvSpPr txBox="1">
+            <a:spLocks noGrp="1"/>
+          </p:cNvSpPr>
+          <p:nvPr/>
+        </p:nvSpPr>
+        <p:spPr>
+          <a:xfrm>
+            <a:off x="3849688" y="0"/>
+            <a:ext cx="2944812" cy="496888"/>
+          </a:xfrm>
+          <a:prstGeom prst="rect">
+            <a:avLst/>
+          </a:prstGeom>
+          <a:noFill/>
+        </p:spPr>
+        <p:txBody>
+          <a:bodyPr vert="horz" lIns="91440" tIns="45720" rIns="91440" bIns="45720" rtlCol="0"/>
+          <a:lstStyle/>
+          <a:p>
+            <a:pPr marL="0" marR="0" lvl="0" indent="0" algn="r" defTabSz="914400" rtl="0" eaLnBrk="1" fontAlgn="auto" latinLnBrk="0" hangingPunct="1">
+              <a:lnSpc>
+                <a:spcPct val="100000"/>
+              </a:lnSpc>
+              <a:spcBef>
+                <a:spcPts val="0"/>
+              </a:spcBef>
+              <a:spcAft>
+                <a:spcPts val="0"/>
+              </a:spcAft>
+              <a:buClrTx/>
+              <a:buSzTx/>
+              <a:buFontTx/>
+              <a:buNone/>
+              <a:tabLst/>
+              <a:defRPr/>
+            </a:pPr>
+            <a:fld id="{FE739F03-1C0E-4075-8044-7DA246F923DA}" type="datetimeFigureOut">
+              <a:rPr kumimoji="0" lang="en-US" sz="1200" b="0" i="0" u="none" strike="noStrike" kern="1200" cap="none" spc="0" normalizeH="0" baseline="0" noProof="0" smtClean="0">
+                <a:ln>
+                  <a:noFill/>
+                </a:ln>
+                <a:solidFill>
+                  <a:schemeClr val="tx1"/>
+                </a:solidFill>
+                <a:effectLst/>
+                <a:uLnTx/>
+                <a:uFillTx/>
+                <a:latin typeface="+mn-lt"/>
+                <a:ea typeface="+mn-ea"/>
+                <a:cs typeface="+mn-cs"/>
+              </a:rPr>
+              <a:pPr marL="0" marR="0" lvl="0" indent="0" algn="r" defTabSz="914400" rtl="0" eaLnBrk="1" fontAlgn="auto" latinLnBrk="0" hangingPunct="1">
+                <a:lnSpc>
+                  <a:spcPct val="100000"/>
+                </a:lnSpc>
+                <a:spcBef>
+                  <a:spcPts val="0"/>
+                </a:spcBef>
+                <a:spcAft>
+                  <a:spcPts val="0"/>
+                </a:spcAft>
+                <a:buClrTx/>
+                <a:buSzTx/>
+                <a:buFontTx/>
+                <a:buNone/>
+                <a:tabLst/>
+                <a:defRPr/>
+              </a:pPr>
+              <a:t>11/11/17</a:t>
+            </a:fld>
+            <a:endParaRPr kumimoji="0" lang="en-US" sz="1200" b="0" i="0" u="none" strike="noStrike" kern="1200" cap="none" spc="0" normalizeH="0" baseline="0" noProof="0">
+              <a:ln>
+                <a:noFill/>
+              </a:ln>
+              <a:solidFill>
+                <a:schemeClr val="tx1"/>
+              </a:solidFill>
+              <a:effectLst/>
+              <a:uLnTx/>
+              <a:uFillTx/>
+              <a:latin typeface="+mn-lt"/>
+              <a:ea typeface="+mn-ea"/>
+              <a:cs typeface="+mn-cs"/>
+            </a:endParaRPr>
+          </a:p>
+        </p:txBody>
+      </p:sp>
+      <p:sp>
+        <p:nvSpPr>
+          <p:cNvPr id="6" name="Slide Number Placeholder 14"/>
+          <p:cNvSpPr txBox="1">
+            <a:spLocks noGrp="1"/>
+          </p:cNvSpPr>
+          <p:nvPr/>
+        </p:nvSpPr>
+        <p:spPr>
+          <a:xfrm>
+            <a:off x="3846600" y="9411840"/>
+            <a:ext cx="2946239" cy="492120"/>
+          </a:xfrm>
+          <a:prstGeom prst="rect">
+            <a:avLst/>
+          </a:prstGeom>
+          <a:noFill/>
+          <a:ln/>
+        </p:spPr>
+        <p:txBody>
+          <a:bodyPr vert="horz" wrap="square" lIns="0" tIns="0" rIns="0" bIns="0" anchor="b" anchorCtr="0" compatLnSpc="1">
+            <a:noAutofit/>
+          </a:bodyPr>
+          <a:lstStyle/>
+          <a:p>
+            <a:pPr marL="0" marR="0" lvl="0" indent="0" algn="r" defTabSz="914400" rtl="0" eaLnBrk="1" fontAlgn="auto" latinLnBrk="0" hangingPunct="0">
+              <a:lnSpc>
+                <a:spcPct val="93000"/>
+              </a:lnSpc>
+              <a:spcBef>
+                <a:spcPts val="0"/>
+              </a:spcBef>
+              <a:spcAft>
+                <a:spcPts val="0"/>
+              </a:spcAft>
+              <a:buClrTx/>
+              <a:buSzTx/>
+              <a:buFontTx/>
+              <a:buNone/>
+              <a:tabLst>
+                <a:tab pos="0" algn="l"/>
+                <a:tab pos="448919" algn="l"/>
+                <a:tab pos="898199" algn="l"/>
+                <a:tab pos="1347480" algn="l"/>
+                <a:tab pos="1796760" algn="l"/>
+                <a:tab pos="2246040" algn="l"/>
+                <a:tab pos="2695320" algn="l"/>
+                <a:tab pos="3144600" algn="l"/>
+                <a:tab pos="3593880" algn="l"/>
+                <a:tab pos="4043159" algn="l"/>
+                <a:tab pos="4492440" algn="l"/>
+                <a:tab pos="4941719" algn="l"/>
+                <a:tab pos="5391000" algn="l"/>
+                <a:tab pos="5840280" algn="l"/>
+                <a:tab pos="6289560" algn="l"/>
+                <a:tab pos="6738840" algn="l"/>
+                <a:tab pos="7188120" algn="l"/>
+                <a:tab pos="7637400" algn="l"/>
+                <a:tab pos="8086679" algn="l"/>
+                <a:tab pos="8535960" algn="l"/>
+                <a:tab pos="8985240" algn="l"/>
+              </a:tabLst>
+              <a:defRPr/>
+            </a:pPr>
+            <a:fld id="{CEF114DB-A5A8-41EC-B45D-1BE7E521F0EC}" type="slidenum">
+              <a:rPr kumimoji="0" lang="pt-PT" sz="1400" b="0" i="0" u="none" strike="noStrike" kern="1200" cap="none" spc="0" normalizeH="0" baseline="0" noProof="0" smtClean="0">
+                <a:ln>
+                  <a:noFill/>
+                </a:ln>
+                <a:solidFill>
+                  <a:srgbClr val="000000"/>
+                </a:solidFill>
+                <a:effectLst/>
+                <a:uLnTx/>
+                <a:uFillTx/>
+                <a:latin typeface="Times New Roman" pitchFamily="18"/>
+                <a:ea typeface="DejaVu Sans" pitchFamily="2"/>
+                <a:cs typeface="DejaVu Sans" pitchFamily="2"/>
+              </a:rPr>
+              <a:pPr marL="0" marR="0" lvl="0" indent="0" algn="r" defTabSz="914400" rtl="0" eaLnBrk="1" fontAlgn="auto" latinLnBrk="0" hangingPunct="0">
+                <a:lnSpc>
+                  <a:spcPct val="93000"/>
+                </a:lnSpc>
+                <a:spcBef>
+                  <a:spcPts val="0"/>
+                </a:spcBef>
+                <a:spcAft>
+                  <a:spcPts val="0"/>
+                </a:spcAft>
+                <a:buClrTx/>
+                <a:buSzTx/>
+                <a:buFontTx/>
+                <a:buNone/>
+                <a:tabLst>
+                  <a:tab pos="0" algn="l"/>
+                  <a:tab pos="448919" algn="l"/>
+                  <a:tab pos="898199" algn="l"/>
+                  <a:tab pos="1347480" algn="l"/>
+                  <a:tab pos="1796760" algn="l"/>
+                  <a:tab pos="2246040" algn="l"/>
+                  <a:tab pos="2695320" algn="l"/>
+                  <a:tab pos="3144600" algn="l"/>
+                  <a:tab pos="3593880" algn="l"/>
+                  <a:tab pos="4043159" algn="l"/>
+                  <a:tab pos="4492440" algn="l"/>
+                  <a:tab pos="4941719" algn="l"/>
+                  <a:tab pos="5391000" algn="l"/>
+                  <a:tab pos="5840280" algn="l"/>
+                  <a:tab pos="6289560" algn="l"/>
+                  <a:tab pos="6738840" algn="l"/>
+                  <a:tab pos="7188120" algn="l"/>
+                  <a:tab pos="7637400" algn="l"/>
+                  <a:tab pos="8086679" algn="l"/>
+                  <a:tab pos="8535960" algn="l"/>
+                  <a:tab pos="8985240" algn="l"/>
+                </a:tabLst>
+                <a:defRPr/>
+              </a:pPr>
+              <a:t>30</a:t>
+            </a:fld>
+            <a:endParaRPr kumimoji="0" lang="pt-PT" sz="1400" b="0" i="0" u="none" strike="noStrike" kern="1200" cap="none" spc="0" normalizeH="0" baseline="0" noProof="0">
+              <a:ln>
+                <a:noFill/>
+              </a:ln>
+              <a:solidFill>
+                <a:srgbClr val="000000"/>
+              </a:solidFill>
+              <a:effectLst/>
+              <a:uLnTx/>
+              <a:uFillTx/>
+              <a:latin typeface="Times New Roman" pitchFamily="18"/>
+              <a:ea typeface="DejaVu Sans" pitchFamily="2"/>
+              <a:cs typeface="DejaVu Sans" pitchFamily="2"/>
+            </a:endParaRPr>
+          </a:p>
+        </p:txBody>
+      </p:sp>
+      <p:sp>
+        <p:nvSpPr>
+          <p:cNvPr id="8" name="Slide Number Placeholder 6"/>
+          <p:cNvSpPr txBox="1">
+            <a:spLocks noGrp="1"/>
+          </p:cNvSpPr>
+          <p:nvPr/>
+        </p:nvSpPr>
+        <p:spPr>
+          <a:xfrm>
+            <a:off x="3846600" y="9411840"/>
+            <a:ext cx="2946239" cy="492120"/>
+          </a:xfrm>
+          <a:prstGeom prst="rect">
+            <a:avLst/>
+          </a:prstGeom>
+          <a:noFill/>
+          <a:ln/>
+        </p:spPr>
+        <p:txBody>
+          <a:bodyPr vert="horz" wrap="square" lIns="91440" tIns="45720" rIns="91440" bIns="45720" rtlCol="0" anchor="b" anchorCtr="0" compatLnSpc="1">
+            <a:noAutofit/>
+          </a:bodyPr>
+          <a:lstStyle/>
+          <a:p>
+            <a:pPr marL="0" marR="0" lvl="0" indent="0" algn="r" defTabSz="914400" rtl="0" eaLnBrk="1" fontAlgn="auto" latinLnBrk="0" hangingPunct="0">
+              <a:lnSpc>
+                <a:spcPct val="93000"/>
+              </a:lnSpc>
+              <a:spcBef>
+                <a:spcPts val="0"/>
+              </a:spcBef>
+              <a:spcAft>
+                <a:spcPts val="0"/>
+              </a:spcAft>
+              <a:buClrTx/>
+              <a:buSzTx/>
+              <a:buFontTx/>
+              <a:buNone/>
+              <a:tabLst>
+                <a:tab pos="0" algn="l"/>
+                <a:tab pos="448919" algn="l"/>
+                <a:tab pos="898199" algn="l"/>
+                <a:tab pos="1347480" algn="l"/>
+                <a:tab pos="1796760" algn="l"/>
+                <a:tab pos="2246040" algn="l"/>
+                <a:tab pos="2695320" algn="l"/>
+                <a:tab pos="3144600" algn="l"/>
+                <a:tab pos="3593880" algn="l"/>
+                <a:tab pos="4043159" algn="l"/>
+                <a:tab pos="4492440" algn="l"/>
+                <a:tab pos="4941719" algn="l"/>
+                <a:tab pos="5391000" algn="l"/>
+                <a:tab pos="5840280" algn="l"/>
+                <a:tab pos="6289560" algn="l"/>
+                <a:tab pos="6738840" algn="l"/>
+                <a:tab pos="7188120" algn="l"/>
+                <a:tab pos="7637400" algn="l"/>
+                <a:tab pos="8086679" algn="l"/>
+                <a:tab pos="8535960" algn="l"/>
+                <a:tab pos="8985240" algn="l"/>
+              </a:tabLst>
+              <a:defRPr/>
+            </a:pPr>
+            <a:fld id="{139AB42B-03F8-4530-82D6-B5FE47A70306}" type="slidenum">
+              <a:rPr kumimoji="0" lang="en-US" sz="1400" b="0" i="0" u="none" strike="noStrike" kern="1200" cap="none" spc="0" normalizeH="0" baseline="0" noProof="0" smtClean="0">
+                <a:ln>
+                  <a:noFill/>
+                </a:ln>
+                <a:solidFill>
+                  <a:srgbClr val="000000"/>
+                </a:solidFill>
+                <a:effectLst/>
+                <a:uLnTx/>
+                <a:uFillTx/>
+                <a:latin typeface="Times New Roman" pitchFamily="18"/>
+                <a:ea typeface="DejaVu Sans" pitchFamily="2"/>
+                <a:cs typeface="DejaVu Sans" pitchFamily="2"/>
+              </a:rPr>
+              <a:pPr marL="0" marR="0" lvl="0" indent="0" algn="r" defTabSz="914400" rtl="0" eaLnBrk="1" fontAlgn="auto" latinLnBrk="0" hangingPunct="0">
+                <a:lnSpc>
+                  <a:spcPct val="93000"/>
+                </a:lnSpc>
+                <a:spcBef>
+                  <a:spcPts val="0"/>
+                </a:spcBef>
+                <a:spcAft>
+                  <a:spcPts val="0"/>
+                </a:spcAft>
+                <a:buClrTx/>
+                <a:buSzTx/>
+                <a:buFontTx/>
+                <a:buNone/>
+                <a:tabLst>
+                  <a:tab pos="0" algn="l"/>
+                  <a:tab pos="448919" algn="l"/>
+                  <a:tab pos="898199" algn="l"/>
+                  <a:tab pos="1347480" algn="l"/>
+                  <a:tab pos="1796760" algn="l"/>
+                  <a:tab pos="2246040" algn="l"/>
+                  <a:tab pos="2695320" algn="l"/>
+                  <a:tab pos="3144600" algn="l"/>
+                  <a:tab pos="3593880" algn="l"/>
+                  <a:tab pos="4043159" algn="l"/>
+                  <a:tab pos="4492440" algn="l"/>
+                  <a:tab pos="4941719" algn="l"/>
+                  <a:tab pos="5391000" algn="l"/>
+                  <a:tab pos="5840280" algn="l"/>
+                  <a:tab pos="6289560" algn="l"/>
+                  <a:tab pos="6738840" algn="l"/>
+                  <a:tab pos="7188120" algn="l"/>
+                  <a:tab pos="7637400" algn="l"/>
+                  <a:tab pos="8086679" algn="l"/>
+                  <a:tab pos="8535960" algn="l"/>
+                  <a:tab pos="8985240" algn="l"/>
+                </a:tabLst>
+                <a:defRPr/>
+              </a:pPr>
+              <a:t>30</a:t>
+            </a:fld>
+            <a:endParaRPr kumimoji="0" lang="en-US" sz="1400" b="0" i="0" u="none" strike="noStrike" kern="1200" cap="none" spc="0" normalizeH="0" baseline="0" noProof="0">
+              <a:ln>
+                <a:noFill/>
+              </a:ln>
+              <a:solidFill>
+                <a:srgbClr val="000000"/>
+              </a:solidFill>
+              <a:effectLst/>
+              <a:uLnTx/>
+              <a:uFillTx/>
+              <a:latin typeface="Times New Roman" pitchFamily="18"/>
+              <a:ea typeface="DejaVu Sans" pitchFamily="2"/>
+              <a:cs typeface="DejaVu Sans" pitchFamily="2"/>
+            </a:endParaRPr>
+          </a:p>
+        </p:txBody>
+      </p:sp>
+      <p:sp>
+        <p:nvSpPr>
+          <p:cNvPr id="2" name="Slide Image Placeholder 1"/>
+          <p:cNvSpPr>
+            <a:spLocks noGrp="1" noRot="1" noChangeAspect="1" noResize="1"/>
+          </p:cNvSpPr>
+          <p:nvPr>
+            <p:ph type="sldImg"/>
+          </p:nvPr>
+        </p:nvSpPr>
+        <p:spPr>
+          <a:xfrm>
+            <a:off x="922338" y="752475"/>
+            <a:ext cx="4946650" cy="3711575"/>
+          </a:xfrm>
+          <a:solidFill>
+            <a:srgbClr val="729FCF"/>
+          </a:solidFill>
+          <a:ln w="25400">
+            <a:solidFill>
+              <a:srgbClr val="3465A4"/>
+            </a:solidFill>
+            <a:prstDash val="solid"/>
+          </a:ln>
+        </p:spPr>
+      </p:sp>
+      <p:sp>
+        <p:nvSpPr>
+          <p:cNvPr id="3" name="Notes Placeholder 2"/>
+          <p:cNvSpPr txBox="1">
+            <a:spLocks noGrp="1"/>
+          </p:cNvSpPr>
+          <p:nvPr>
+            <p:ph type="body" sz="quarter" idx="1"/>
+          </p:nvPr>
+        </p:nvSpPr>
+        <p:spPr>
+          <a:xfrm>
+            <a:off x="678960" y="4705200"/>
+            <a:ext cx="5434200" cy="4454640"/>
+          </a:xfrm>
+          <a:noFill/>
+          <a:ln>
+            <a:noFill/>
+          </a:ln>
+        </p:spPr>
+        <p:txBody>
+          <a:bodyPr lIns="0" tIns="0" rIns="0" bIns="0" compatLnSpc="1">
+            <a:spAutoFit/>
+          </a:bodyPr>
+          <a:lstStyle/>
+          <a:p>
+            <a:endParaRPr lang="pt-PT"/>
+          </a:p>
+        </p:txBody>
+      </p:sp>
+    </p:spTree>
+    <p:extLst>
+      <p:ext uri="{BB962C8B-B14F-4D97-AF65-F5344CB8AC3E}">
+        <p14:creationId xmlns:p14="http://schemas.microsoft.com/office/powerpoint/2010/main" val="522678345"/>
+      </p:ext>
+    </p:extLst>
+  </p:cSld>
+  <p:clrMapOvr>
+    <a:masterClrMapping/>
+  </p:clrMapOvr>
+</p:notes>
+</file>
+
+<file path=ppt/notesSlides/notesSlide29.xml><?xml version="1.0" encoding="utf-8"?>
+<p:notes xmlns:a="http://schemas.openxmlformats.org/drawingml/2006/main" xmlns:r="http://schemas.openxmlformats.org/officeDocument/2006/relationships" xmlns:p="http://schemas.openxmlformats.org/presentationml/2006/main">
+  <p:cSld>
+    <p:spTree>
+      <p:nvGrpSpPr>
+        <p:cNvPr id="1" name=""/>
+        <p:cNvGrpSpPr/>
+        <p:nvPr/>
+      </p:nvGrpSpPr>
+      <p:grpSpPr>
+        <a:xfrm>
+          <a:off x="0" y="0"/>
+          <a:ext cx="0" cy="0"/>
+          <a:chOff x="0" y="0"/>
+          <a:chExt cx="0" cy="0"/>
+        </a:xfrm>
+      </p:grpSpPr>
+      <p:sp>
+        <p:nvSpPr>
+          <p:cNvPr id="5" name="Date Placeholder 2"/>
+          <p:cNvSpPr txBox="1">
+            <a:spLocks noGrp="1"/>
+          </p:cNvSpPr>
+          <p:nvPr/>
+        </p:nvSpPr>
+        <p:spPr>
+          <a:xfrm>
+            <a:off x="3849688" y="0"/>
+            <a:ext cx="2944812" cy="496888"/>
+          </a:xfrm>
+          <a:prstGeom prst="rect">
+            <a:avLst/>
+          </a:prstGeom>
+          <a:noFill/>
+        </p:spPr>
+        <p:txBody>
+          <a:bodyPr vert="horz" lIns="91440" tIns="45720" rIns="91440" bIns="45720" rtlCol="0"/>
+          <a:lstStyle/>
+          <a:p>
+            <a:pPr marL="0" marR="0" lvl="0" indent="0" algn="r" defTabSz="914400" rtl="0" eaLnBrk="1" fontAlgn="auto" latinLnBrk="0" hangingPunct="1">
+              <a:lnSpc>
+                <a:spcPct val="100000"/>
+              </a:lnSpc>
+              <a:spcBef>
+                <a:spcPts val="0"/>
+              </a:spcBef>
+              <a:spcAft>
+                <a:spcPts val="0"/>
+              </a:spcAft>
+              <a:buClrTx/>
+              <a:buSzTx/>
+              <a:buFontTx/>
+              <a:buNone/>
+              <a:tabLst/>
+              <a:defRPr/>
+            </a:pPr>
+            <a:fld id="{FE739F03-1C0E-4075-8044-7DA246F923DA}" type="datetimeFigureOut">
+              <a:rPr kumimoji="0" lang="en-US" sz="1200" b="0" i="0" u="none" strike="noStrike" kern="1200" cap="none" spc="0" normalizeH="0" baseline="0" noProof="0" smtClean="0">
+                <a:ln>
+                  <a:noFill/>
+                </a:ln>
+                <a:solidFill>
+                  <a:schemeClr val="tx1"/>
+                </a:solidFill>
+                <a:effectLst/>
+                <a:uLnTx/>
+                <a:uFillTx/>
+                <a:latin typeface="+mn-lt"/>
+                <a:ea typeface="+mn-ea"/>
+                <a:cs typeface="+mn-cs"/>
+              </a:rPr>
+              <a:pPr marL="0" marR="0" lvl="0" indent="0" algn="r" defTabSz="914400" rtl="0" eaLnBrk="1" fontAlgn="auto" latinLnBrk="0" hangingPunct="1">
+                <a:lnSpc>
+                  <a:spcPct val="100000"/>
+                </a:lnSpc>
+                <a:spcBef>
+                  <a:spcPts val="0"/>
+                </a:spcBef>
+                <a:spcAft>
+                  <a:spcPts val="0"/>
+                </a:spcAft>
+                <a:buClrTx/>
+                <a:buSzTx/>
+                <a:buFontTx/>
+                <a:buNone/>
+                <a:tabLst/>
+                <a:defRPr/>
+              </a:pPr>
+              <a:t>11/11/17</a:t>
+            </a:fld>
+            <a:endParaRPr kumimoji="0" lang="en-US" sz="1200" b="0" i="0" u="none" strike="noStrike" kern="1200" cap="none" spc="0" normalizeH="0" baseline="0" noProof="0">
+              <a:ln>
+                <a:noFill/>
+              </a:ln>
+              <a:solidFill>
+                <a:schemeClr val="tx1"/>
+              </a:solidFill>
+              <a:effectLst/>
+              <a:uLnTx/>
+              <a:uFillTx/>
+              <a:latin typeface="+mn-lt"/>
+              <a:ea typeface="+mn-ea"/>
+              <a:cs typeface="+mn-cs"/>
+            </a:endParaRPr>
+          </a:p>
+        </p:txBody>
+      </p:sp>
+      <p:sp>
+        <p:nvSpPr>
+          <p:cNvPr id="6" name="Slide Number Placeholder 14"/>
+          <p:cNvSpPr txBox="1">
+            <a:spLocks noGrp="1"/>
+          </p:cNvSpPr>
+          <p:nvPr/>
+        </p:nvSpPr>
+        <p:spPr>
+          <a:xfrm>
+            <a:off x="3846600" y="9411840"/>
+            <a:ext cx="2946239" cy="492120"/>
+          </a:xfrm>
+          <a:prstGeom prst="rect">
+            <a:avLst/>
+          </a:prstGeom>
+          <a:noFill/>
+          <a:ln/>
+        </p:spPr>
+        <p:txBody>
+          <a:bodyPr vert="horz" wrap="square" lIns="0" tIns="0" rIns="0" bIns="0" anchor="b" anchorCtr="0" compatLnSpc="1">
+            <a:noAutofit/>
+          </a:bodyPr>
+          <a:lstStyle/>
+          <a:p>
+            <a:pPr marL="0" marR="0" lvl="0" indent="0" algn="r" defTabSz="914400" rtl="0" eaLnBrk="1" fontAlgn="auto" latinLnBrk="0" hangingPunct="0">
+              <a:lnSpc>
+                <a:spcPct val="93000"/>
+              </a:lnSpc>
+              <a:spcBef>
+                <a:spcPts val="0"/>
+              </a:spcBef>
+              <a:spcAft>
+                <a:spcPts val="0"/>
+              </a:spcAft>
+              <a:buClrTx/>
+              <a:buSzTx/>
+              <a:buFontTx/>
+              <a:buNone/>
+              <a:tabLst>
+                <a:tab pos="0" algn="l"/>
+                <a:tab pos="448919" algn="l"/>
+                <a:tab pos="898199" algn="l"/>
+                <a:tab pos="1347480" algn="l"/>
+                <a:tab pos="1796760" algn="l"/>
+                <a:tab pos="2246040" algn="l"/>
+                <a:tab pos="2695320" algn="l"/>
+                <a:tab pos="3144600" algn="l"/>
+                <a:tab pos="3593880" algn="l"/>
+                <a:tab pos="4043159" algn="l"/>
+                <a:tab pos="4492440" algn="l"/>
+                <a:tab pos="4941719" algn="l"/>
+                <a:tab pos="5391000" algn="l"/>
+                <a:tab pos="5840280" algn="l"/>
+                <a:tab pos="6289560" algn="l"/>
+                <a:tab pos="6738840" algn="l"/>
+                <a:tab pos="7188120" algn="l"/>
+                <a:tab pos="7637400" algn="l"/>
+                <a:tab pos="8086679" algn="l"/>
+                <a:tab pos="8535960" algn="l"/>
+                <a:tab pos="8985240" algn="l"/>
+              </a:tabLst>
+              <a:defRPr/>
+            </a:pPr>
+            <a:fld id="{CEF114DB-A5A8-41EC-B45D-1BE7E521F0EC}" type="slidenum">
+              <a:rPr kumimoji="0" lang="pt-PT" sz="1400" b="0" i="0" u="none" strike="noStrike" kern="1200" cap="none" spc="0" normalizeH="0" baseline="0" noProof="0" smtClean="0">
+                <a:ln>
+                  <a:noFill/>
+                </a:ln>
+                <a:solidFill>
+                  <a:srgbClr val="000000"/>
+                </a:solidFill>
+                <a:effectLst/>
+                <a:uLnTx/>
+                <a:uFillTx/>
+                <a:latin typeface="Times New Roman" pitchFamily="18"/>
+                <a:ea typeface="DejaVu Sans" pitchFamily="2"/>
+                <a:cs typeface="DejaVu Sans" pitchFamily="2"/>
+              </a:rPr>
+              <a:pPr marL="0" marR="0" lvl="0" indent="0" algn="r" defTabSz="914400" rtl="0" eaLnBrk="1" fontAlgn="auto" latinLnBrk="0" hangingPunct="0">
+                <a:lnSpc>
+                  <a:spcPct val="93000"/>
+                </a:lnSpc>
+                <a:spcBef>
+                  <a:spcPts val="0"/>
+                </a:spcBef>
+                <a:spcAft>
+                  <a:spcPts val="0"/>
+                </a:spcAft>
+                <a:buClrTx/>
+                <a:buSzTx/>
+                <a:buFontTx/>
+                <a:buNone/>
+                <a:tabLst>
+                  <a:tab pos="0" algn="l"/>
+                  <a:tab pos="448919" algn="l"/>
+                  <a:tab pos="898199" algn="l"/>
+                  <a:tab pos="1347480" algn="l"/>
+                  <a:tab pos="1796760" algn="l"/>
+                  <a:tab pos="2246040" algn="l"/>
+                  <a:tab pos="2695320" algn="l"/>
+                  <a:tab pos="3144600" algn="l"/>
+                  <a:tab pos="3593880" algn="l"/>
+                  <a:tab pos="4043159" algn="l"/>
+                  <a:tab pos="4492440" algn="l"/>
+                  <a:tab pos="4941719" algn="l"/>
+                  <a:tab pos="5391000" algn="l"/>
+                  <a:tab pos="5840280" algn="l"/>
+                  <a:tab pos="6289560" algn="l"/>
+                  <a:tab pos="6738840" algn="l"/>
+                  <a:tab pos="7188120" algn="l"/>
+                  <a:tab pos="7637400" algn="l"/>
+                  <a:tab pos="8086679" algn="l"/>
+                  <a:tab pos="8535960" algn="l"/>
+                  <a:tab pos="8985240" algn="l"/>
+                </a:tabLst>
+                <a:defRPr/>
+              </a:pPr>
+              <a:t>31</a:t>
+            </a:fld>
+            <a:endParaRPr kumimoji="0" lang="pt-PT" sz="1400" b="0" i="0" u="none" strike="noStrike" kern="1200" cap="none" spc="0" normalizeH="0" baseline="0" noProof="0">
+              <a:ln>
+                <a:noFill/>
+              </a:ln>
+              <a:solidFill>
+                <a:srgbClr val="000000"/>
+              </a:solidFill>
+              <a:effectLst/>
+              <a:uLnTx/>
+              <a:uFillTx/>
+              <a:latin typeface="Times New Roman" pitchFamily="18"/>
+              <a:ea typeface="DejaVu Sans" pitchFamily="2"/>
+              <a:cs typeface="DejaVu Sans" pitchFamily="2"/>
+            </a:endParaRPr>
+          </a:p>
+        </p:txBody>
+      </p:sp>
+      <p:sp>
+        <p:nvSpPr>
+          <p:cNvPr id="8" name="Slide Number Placeholder 6"/>
+          <p:cNvSpPr txBox="1">
+            <a:spLocks noGrp="1"/>
+          </p:cNvSpPr>
+          <p:nvPr/>
+        </p:nvSpPr>
+        <p:spPr>
+          <a:xfrm>
+            <a:off x="3846600" y="9411840"/>
+            <a:ext cx="2946239" cy="492120"/>
+          </a:xfrm>
+          <a:prstGeom prst="rect">
+            <a:avLst/>
+          </a:prstGeom>
+          <a:noFill/>
+          <a:ln/>
+        </p:spPr>
+        <p:txBody>
+          <a:bodyPr vert="horz" wrap="square" lIns="91440" tIns="45720" rIns="91440" bIns="45720" rtlCol="0" anchor="b" anchorCtr="0" compatLnSpc="1">
+            <a:noAutofit/>
+          </a:bodyPr>
+          <a:lstStyle/>
+          <a:p>
+            <a:pPr marL="0" marR="0" lvl="0" indent="0" algn="r" defTabSz="914400" rtl="0" eaLnBrk="1" fontAlgn="auto" latinLnBrk="0" hangingPunct="0">
+              <a:lnSpc>
+                <a:spcPct val="93000"/>
+              </a:lnSpc>
+              <a:spcBef>
+                <a:spcPts val="0"/>
+              </a:spcBef>
+              <a:spcAft>
+                <a:spcPts val="0"/>
+              </a:spcAft>
+              <a:buClrTx/>
+              <a:buSzTx/>
+              <a:buFontTx/>
+              <a:buNone/>
+              <a:tabLst>
+                <a:tab pos="0" algn="l"/>
+                <a:tab pos="448919" algn="l"/>
+                <a:tab pos="898199" algn="l"/>
+                <a:tab pos="1347480" algn="l"/>
+                <a:tab pos="1796760" algn="l"/>
+                <a:tab pos="2246040" algn="l"/>
+                <a:tab pos="2695320" algn="l"/>
+                <a:tab pos="3144600" algn="l"/>
+                <a:tab pos="3593880" algn="l"/>
+                <a:tab pos="4043159" algn="l"/>
+                <a:tab pos="4492440" algn="l"/>
+                <a:tab pos="4941719" algn="l"/>
+                <a:tab pos="5391000" algn="l"/>
+                <a:tab pos="5840280" algn="l"/>
+                <a:tab pos="6289560" algn="l"/>
+                <a:tab pos="6738840" algn="l"/>
+                <a:tab pos="7188120" algn="l"/>
+                <a:tab pos="7637400" algn="l"/>
+                <a:tab pos="8086679" algn="l"/>
+                <a:tab pos="8535960" algn="l"/>
+                <a:tab pos="8985240" algn="l"/>
+              </a:tabLst>
+              <a:defRPr/>
+            </a:pPr>
+            <a:fld id="{139AB42B-03F8-4530-82D6-B5FE47A70306}" type="slidenum">
+              <a:rPr kumimoji="0" lang="en-US" sz="1400" b="0" i="0" u="none" strike="noStrike" kern="1200" cap="none" spc="0" normalizeH="0" baseline="0" noProof="0" smtClean="0">
+                <a:ln>
+                  <a:noFill/>
+                </a:ln>
+                <a:solidFill>
+                  <a:srgbClr val="000000"/>
+                </a:solidFill>
+                <a:effectLst/>
+                <a:uLnTx/>
+                <a:uFillTx/>
+                <a:latin typeface="Times New Roman" pitchFamily="18"/>
+                <a:ea typeface="DejaVu Sans" pitchFamily="2"/>
+                <a:cs typeface="DejaVu Sans" pitchFamily="2"/>
+              </a:rPr>
+              <a:pPr marL="0" marR="0" lvl="0" indent="0" algn="r" defTabSz="914400" rtl="0" eaLnBrk="1" fontAlgn="auto" latinLnBrk="0" hangingPunct="0">
+                <a:lnSpc>
+                  <a:spcPct val="93000"/>
+                </a:lnSpc>
+                <a:spcBef>
+                  <a:spcPts val="0"/>
+                </a:spcBef>
+                <a:spcAft>
+                  <a:spcPts val="0"/>
+                </a:spcAft>
+                <a:buClrTx/>
+                <a:buSzTx/>
+                <a:buFontTx/>
+                <a:buNone/>
+                <a:tabLst>
+                  <a:tab pos="0" algn="l"/>
+                  <a:tab pos="448919" algn="l"/>
+                  <a:tab pos="898199" algn="l"/>
+                  <a:tab pos="1347480" algn="l"/>
+                  <a:tab pos="1796760" algn="l"/>
+                  <a:tab pos="2246040" algn="l"/>
+                  <a:tab pos="2695320" algn="l"/>
+                  <a:tab pos="3144600" algn="l"/>
+                  <a:tab pos="3593880" algn="l"/>
+                  <a:tab pos="4043159" algn="l"/>
+                  <a:tab pos="4492440" algn="l"/>
+                  <a:tab pos="4941719" algn="l"/>
+                  <a:tab pos="5391000" algn="l"/>
+                  <a:tab pos="5840280" algn="l"/>
+                  <a:tab pos="6289560" algn="l"/>
+                  <a:tab pos="6738840" algn="l"/>
+                  <a:tab pos="7188120" algn="l"/>
+                  <a:tab pos="7637400" algn="l"/>
+                  <a:tab pos="8086679" algn="l"/>
+                  <a:tab pos="8535960" algn="l"/>
+                  <a:tab pos="8985240" algn="l"/>
+                </a:tabLst>
+                <a:defRPr/>
+              </a:pPr>
+              <a:t>31</a:t>
             </a:fld>
             <a:endParaRPr kumimoji="0" lang="en-US" sz="1400" b="0" i="0" u="none" strike="noStrike" kern="1200" cap="none" spc="0" normalizeH="0" baseline="0" noProof="0">
               <a:ln>
@@ -22716,6 +23168,214 @@
       <p:sp>
         <p:nvSpPr>
           <p:cNvPr id="2" name="Title 1"/>
+          <p:cNvSpPr>
+            <a:spLocks noGrp="1"/>
+          </p:cNvSpPr>
+          <p:nvPr>
+            <p:ph type="title"/>
+          </p:nvPr>
+        </p:nvSpPr>
+        <p:spPr/>
+        <p:txBody>
+          <a:bodyPr/>
+          <a:lstStyle/>
+          <a:p>
+            <a:endParaRPr lang="en-US"/>
+          </a:p>
+        </p:txBody>
+      </p:sp>
+    </p:spTree>
+    <p:extLst>
+      <p:ext uri="{BB962C8B-B14F-4D97-AF65-F5344CB8AC3E}">
+        <p14:creationId xmlns:p14="http://schemas.microsoft.com/office/powerpoint/2010/main" val="1902304131"/>
+      </p:ext>
+    </p:extLst>
+  </p:cSld>
+  <p:clrMapOvr>
+    <a:masterClrMapping/>
+  </p:clrMapOvr>
+</p:sld>
+</file>
+
+<file path=ppt/slides/slide24.xml><?xml version="1.0" encoding="utf-8"?>
+<p:sld xmlns:a="http://schemas.openxmlformats.org/drawingml/2006/main" xmlns:r="http://schemas.openxmlformats.org/officeDocument/2006/relationships" xmlns:p="http://schemas.openxmlformats.org/presentationml/2006/main">
+  <p:cSld>
+    <p:spTree>
+      <p:nvGrpSpPr>
+        <p:cNvPr id="1" name=""/>
+        <p:cNvGrpSpPr/>
+        <p:nvPr/>
+      </p:nvGrpSpPr>
+      <p:grpSpPr>
+        <a:xfrm>
+          <a:off x="0" y="0"/>
+          <a:ext cx="0" cy="0"/>
+          <a:chOff x="0" y="0"/>
+          <a:chExt cx="0" cy="0"/>
+        </a:xfrm>
+      </p:grpSpPr>
+      <p:sp>
+        <p:nvSpPr>
+          <p:cNvPr id="2" name="Title 1"/>
+          <p:cNvSpPr txBox="1">
+            <a:spLocks noGrp="1"/>
+          </p:cNvSpPr>
+          <p:nvPr>
+            <p:ph type="title" idx="4294967295"/>
+          </p:nvPr>
+        </p:nvSpPr>
+        <p:spPr>
+          <a:xfrm>
+            <a:off x="457200" y="507446"/>
+            <a:ext cx="8229240" cy="677108"/>
+          </a:xfrm>
+        </p:spPr>
+        <p:txBody>
+          <a:bodyPr>
+            <a:spAutoFit/>
+          </a:bodyPr>
+          <a:lstStyle/>
+          <a:p>
+            <a:r>
+              <a:rPr lang="pt-PT" dirty="0" smtClean="0"/>
+              <a:t>Show me </a:t>
+            </a:r>
+            <a:r>
+              <a:rPr lang="pt-PT" dirty="0" err="1" smtClean="0"/>
+              <a:t>the</a:t>
+            </a:r>
+            <a:r>
+              <a:rPr lang="pt-PT" dirty="0" smtClean="0"/>
+              <a:t> </a:t>
+            </a:r>
+            <a:r>
+              <a:rPr lang="pt-PT" dirty="0" err="1" smtClean="0"/>
+              <a:t>code</a:t>
+            </a:r>
+            <a:r>
+              <a:rPr lang="pt-PT" dirty="0" smtClean="0"/>
+              <a:t>!</a:t>
+            </a:r>
+            <a:endParaRPr lang="pt-PT" dirty="0"/>
+          </a:p>
+        </p:txBody>
+      </p:sp>
+      <p:sp>
+        <p:nvSpPr>
+          <p:cNvPr id="3" name="Text Placeholder 2"/>
+          <p:cNvSpPr txBox="1">
+            <a:spLocks noGrp="1"/>
+          </p:cNvSpPr>
+          <p:nvPr>
+            <p:ph type="body" idx="4294967295"/>
+          </p:nvPr>
+        </p:nvSpPr>
+        <p:spPr>
+          <a:xfrm>
+            <a:off x="457200" y="1604520"/>
+            <a:ext cx="8229240" cy="3977279"/>
+          </a:xfrm>
+        </p:spPr>
+        <p:txBody>
+          <a:bodyPr/>
+          <a:lstStyle/>
+          <a:p>
+            <a:pPr marL="457200" lvl="0" indent="-457200" hangingPunct="1">
+              <a:spcBef>
+                <a:spcPts val="0"/>
+              </a:spcBef>
+              <a:buFont typeface="Arial" charset="0"/>
+              <a:buChar char="•"/>
+              <a:tabLst/>
+              <a:defRPr/>
+            </a:pPr>
+            <a:r>
+              <a:rPr lang="pt-PT" dirty="0">
+                <a:hlinkClick r:id="rId3"/>
+              </a:rPr>
+              <a:t>https://</a:t>
+            </a:r>
+            <a:r>
+              <a:rPr lang="pt-PT" dirty="0" smtClean="0">
+                <a:hlinkClick r:id="rId3"/>
+              </a:rPr>
+              <a:t>www.drupal.org/project/drupal/git-instructions</a:t>
+            </a:r>
+            <a:r>
+              <a:rPr lang="pt-PT" dirty="0" smtClean="0"/>
+              <a:t> </a:t>
+            </a:r>
+          </a:p>
+          <a:p>
+            <a:pPr marL="457200" lvl="0" indent="-457200" hangingPunct="1">
+              <a:spcBef>
+                <a:spcPts val="0"/>
+              </a:spcBef>
+              <a:buFont typeface="Arial" charset="0"/>
+              <a:buChar char="•"/>
+              <a:tabLst/>
+              <a:defRPr/>
+            </a:pPr>
+            <a:r>
+              <a:rPr lang="pt-PT" dirty="0">
+                <a:hlinkClick r:id="rId4"/>
+              </a:rPr>
+              <a:t>https://</a:t>
+            </a:r>
+            <a:r>
+              <a:rPr lang="pt-PT" dirty="0" smtClean="0">
+                <a:hlinkClick r:id="rId4"/>
+              </a:rPr>
+              <a:t>github.com/drupal/drupal</a:t>
+            </a:r>
+            <a:r>
+              <a:rPr lang="pt-PT" dirty="0" smtClean="0"/>
+              <a:t> </a:t>
+            </a:r>
+            <a:endParaRPr lang="pt-PT" dirty="0" smtClean="0"/>
+          </a:p>
+        </p:txBody>
+      </p:sp>
+    </p:spTree>
+    <p:extLst>
+      <p:ext uri="{BB962C8B-B14F-4D97-AF65-F5344CB8AC3E}">
+        <p14:creationId xmlns:p14="http://schemas.microsoft.com/office/powerpoint/2010/main" val="288993181"/>
+      </p:ext>
+    </p:extLst>
+  </p:cSld>
+  <p:clrMapOvr>
+    <a:masterClrMapping/>
+  </p:clrMapOvr>
+  <p:timing>
+    <p:tnLst>
+      <p:par>
+        <p:cTn id="1" dur="indefinite" restart="never" nodeType="tmRoot"/>
+      </p:par>
+    </p:tnLst>
+  </p:timing>
+</p:sld>
+</file>
+
+<file path=ppt/slides/slide25.xml><?xml version="1.0" encoding="utf-8"?>
+<p:sld xmlns:a="http://schemas.openxmlformats.org/drawingml/2006/main" xmlns:r="http://schemas.openxmlformats.org/officeDocument/2006/relationships" xmlns:p="http://schemas.openxmlformats.org/presentationml/2006/main">
+  <p:cSld>
+    <p:spTree>
+      <p:nvGrpSpPr>
+        <p:cNvPr id="1" name=""/>
+        <p:cNvGrpSpPr/>
+        <p:nvPr/>
+      </p:nvGrpSpPr>
+      <p:grpSpPr>
+        <a:xfrm>
+          <a:off x="0" y="0"/>
+          <a:ext cx="0" cy="0"/>
+          <a:chOff x="0" y="0"/>
+          <a:chExt cx="0" cy="0"/>
+        </a:xfrm>
+      </p:grpSpPr>
+      <p:sp>
+        <p:nvSpPr>
+          <p:cNvPr id="2" name="Title 1"/>
           <p:cNvSpPr txBox="1">
             <a:spLocks noGrp="1"/>
           </p:cNvSpPr>
@@ -22876,7 +23536,7 @@
 </p:sld>
 </file>
 
-<file path=ppt/slides/slide24.xml><?xml version="1.0" encoding="utf-8"?>
+<file path=ppt/slides/slide26.xml><?xml version="1.0" encoding="utf-8"?>
 <p:sld xmlns:a="http://schemas.openxmlformats.org/drawingml/2006/main" xmlns:r="http://schemas.openxmlformats.org/officeDocument/2006/relationships" xmlns:p="http://schemas.openxmlformats.org/presentationml/2006/main">
   <p:cSld>
     <p:spTree>
@@ -22986,358 +23646,6 @@
 </p:sld>
 </file>
 
-<file path=ppt/slides/slide25.xml><?xml version="1.0" encoding="utf-8"?>
-<p:sld xmlns:a="http://schemas.openxmlformats.org/drawingml/2006/main" xmlns:r="http://schemas.openxmlformats.org/officeDocument/2006/relationships" xmlns:p="http://schemas.openxmlformats.org/presentationml/2006/main">
-  <p:cSld>
-    <p:spTree>
-      <p:nvGrpSpPr>
-        <p:cNvPr id="1" name=""/>
-        <p:cNvGrpSpPr/>
-        <p:nvPr/>
-      </p:nvGrpSpPr>
-      <p:grpSpPr>
-        <a:xfrm>
-          <a:off x="0" y="0"/>
-          <a:ext cx="0" cy="0"/>
-          <a:chOff x="0" y="0"/>
-          <a:chExt cx="0" cy="0"/>
-        </a:xfrm>
-      </p:grpSpPr>
-      <p:sp>
-        <p:nvSpPr>
-          <p:cNvPr id="2" name="Title 1"/>
-          <p:cNvSpPr>
-            <a:spLocks noGrp="1"/>
-          </p:cNvSpPr>
-          <p:nvPr>
-            <p:ph type="title"/>
-          </p:nvPr>
-        </p:nvSpPr>
-        <p:spPr/>
-        <p:txBody>
-          <a:bodyPr/>
-          <a:lstStyle/>
-          <a:p>
-            <a:r>
-              <a:rPr lang="en-US" dirty="0" smtClean="0">
-                <a:hlinkClick r:id="rId3"/>
-              </a:rPr>
-              <a:t>Community</a:t>
-            </a:r>
-            <a:endParaRPr lang="en-US" dirty="0"/>
-          </a:p>
-        </p:txBody>
-      </p:sp>
-      <p:sp>
-        <p:nvSpPr>
-          <p:cNvPr id="3" name="Content Placeholder 2"/>
-          <p:cNvSpPr>
-            <a:spLocks noGrp="1"/>
-          </p:cNvSpPr>
-          <p:nvPr>
-            <p:ph idx="1"/>
-          </p:nvPr>
-        </p:nvSpPr>
-        <p:spPr/>
-        <p:txBody>
-          <a:bodyPr/>
-          <a:lstStyle/>
-          <a:p>
-            <a:pPr marL="457200" indent="-457200">
-              <a:buFont typeface="Arial" charset="0"/>
-              <a:buChar char="•"/>
-            </a:pPr>
-            <a:r>
-              <a:rPr lang="en-US" dirty="0" smtClean="0">
-                <a:hlinkClick r:id="rId4"/>
-              </a:rPr>
-              <a:t>Online and Local Groups</a:t>
-            </a:r>
-            <a:endParaRPr lang="en-US" dirty="0" smtClean="0"/>
-          </a:p>
-          <a:p>
-            <a:pPr marL="457200" indent="-457200">
-              <a:buFont typeface="Arial" charset="0"/>
-              <a:buChar char="•"/>
-            </a:pPr>
-            <a:r>
-              <a:rPr lang="en-US" dirty="0" smtClean="0">
-                <a:hlinkClick r:id="rId5"/>
-              </a:rPr>
-              <a:t>Events and Meetups</a:t>
-            </a:r>
-            <a:endParaRPr lang="en-US" dirty="0" smtClean="0"/>
-          </a:p>
-          <a:p>
-            <a:pPr marL="457200" indent="-457200">
-              <a:buFont typeface="Arial" charset="0"/>
-              <a:buChar char="•"/>
-            </a:pPr>
-            <a:r>
-              <a:rPr lang="en-US" dirty="0" smtClean="0">
-                <a:hlinkClick r:id="rId6"/>
-              </a:rPr>
-              <a:t>IRC</a:t>
-            </a:r>
-            <a:endParaRPr lang="en-US" dirty="0" smtClean="0"/>
-          </a:p>
-          <a:p>
-            <a:pPr marL="457200" indent="-457200">
-              <a:buFont typeface="Arial" charset="0"/>
-              <a:buChar char="•"/>
-            </a:pPr>
-            <a:r>
-              <a:rPr lang="en-US" dirty="0" smtClean="0">
-                <a:hlinkClick r:id="rId7" action="ppaction://hlinkfile"/>
-              </a:rPr>
-              <a:t>Planet Drupal</a:t>
-            </a:r>
-            <a:endParaRPr lang="en-US" dirty="0" smtClean="0"/>
-          </a:p>
-          <a:p>
-            <a:pPr marL="457200" indent="-457200">
-              <a:buFont typeface="Arial" charset="0"/>
-              <a:buChar char="•"/>
-            </a:pPr>
-            <a:r>
-              <a:rPr lang="en-US" dirty="0" smtClean="0">
-                <a:hlinkClick r:id="rId3"/>
-              </a:rPr>
-              <a:t>And much, much more</a:t>
-            </a:r>
-            <a:endParaRPr lang="en-US" dirty="0"/>
-          </a:p>
-        </p:txBody>
-      </p:sp>
-    </p:spTree>
-    <p:extLst>
-      <p:ext uri="{BB962C8B-B14F-4D97-AF65-F5344CB8AC3E}">
-        <p14:creationId xmlns:p14="http://schemas.microsoft.com/office/powerpoint/2010/main" val="1019892027"/>
-      </p:ext>
-    </p:extLst>
-  </p:cSld>
-  <p:clrMapOvr>
-    <a:masterClrMapping/>
-  </p:clrMapOvr>
-  <p:timing>
-    <p:tnLst>
-      <p:par>
-        <p:cTn id="1" dur="indefinite" restart="never" nodeType="tmRoot"/>
-      </p:par>
-    </p:tnLst>
-  </p:timing>
-</p:sld>
-</file>
-
-<file path=ppt/slides/slide26.xml><?xml version="1.0" encoding="utf-8"?>
-<p:sld xmlns:a="http://schemas.openxmlformats.org/drawingml/2006/main" xmlns:r="http://schemas.openxmlformats.org/officeDocument/2006/relationships" xmlns:p="http://schemas.openxmlformats.org/presentationml/2006/main">
-  <p:cSld>
-    <p:spTree>
-      <p:nvGrpSpPr>
-        <p:cNvPr id="1" name=""/>
-        <p:cNvGrpSpPr/>
-        <p:nvPr/>
-      </p:nvGrpSpPr>
-      <p:grpSpPr>
-        <a:xfrm>
-          <a:off x="0" y="0"/>
-          <a:ext cx="0" cy="0"/>
-          <a:chOff x="0" y="0"/>
-          <a:chExt cx="0" cy="0"/>
-        </a:xfrm>
-      </p:grpSpPr>
-      <p:sp>
-        <p:nvSpPr>
-          <p:cNvPr id="2" name="Title 1"/>
-          <p:cNvSpPr txBox="1">
-            <a:spLocks noGrp="1"/>
-          </p:cNvSpPr>
-          <p:nvPr>
-            <p:ph type="title" idx="4294967295"/>
-          </p:nvPr>
-        </p:nvSpPr>
-        <p:spPr>
-          <a:xfrm>
-            <a:off x="457200" y="507446"/>
-            <a:ext cx="8229240" cy="677108"/>
-          </a:xfrm>
-        </p:spPr>
-        <p:txBody>
-          <a:bodyPr>
-            <a:spAutoFit/>
-          </a:bodyPr>
-          <a:lstStyle/>
-          <a:p>
-            <a:r>
-              <a:rPr lang="pt-PT" dirty="0" smtClean="0"/>
-              <a:t>Portuguese </a:t>
-            </a:r>
-            <a:r>
-              <a:rPr lang="pt-PT" dirty="0" err="1" smtClean="0"/>
-              <a:t>Community</a:t>
-            </a:r>
-            <a:endParaRPr lang="pt-PT" dirty="0"/>
-          </a:p>
-        </p:txBody>
-      </p:sp>
-      <p:sp>
-        <p:nvSpPr>
-          <p:cNvPr id="3" name="Text Placeholder 2"/>
-          <p:cNvSpPr txBox="1">
-            <a:spLocks noGrp="1"/>
-          </p:cNvSpPr>
-          <p:nvPr>
-            <p:ph type="body" idx="4294967295"/>
-          </p:nvPr>
-        </p:nvSpPr>
-        <p:spPr>
-          <a:xfrm>
-            <a:off x="457200" y="1604520"/>
-            <a:ext cx="8229240" cy="3977279"/>
-          </a:xfrm>
-        </p:spPr>
-        <p:txBody>
-          <a:bodyPr/>
-          <a:lstStyle/>
-          <a:p>
-            <a:r>
-              <a:rPr lang="pt-PT" dirty="0"/>
-              <a:t>Website: </a:t>
-            </a:r>
-            <a:r>
-              <a:rPr lang="pt-PT" dirty="0">
-                <a:hlinkClick r:id="rId3"/>
-              </a:rPr>
-              <a:t>http://</a:t>
-            </a:r>
-            <a:r>
-              <a:rPr lang="pt-PT" dirty="0" smtClean="0">
-                <a:hlinkClick r:id="rId3"/>
-              </a:rPr>
-              <a:t>drupal-pt.org/</a:t>
-            </a:r>
-            <a:endParaRPr lang="pt-PT" dirty="0" smtClean="0"/>
-          </a:p>
-          <a:p>
-            <a:r>
-              <a:rPr lang="pt-PT" dirty="0" err="1" smtClean="0"/>
-              <a:t>Telegram</a:t>
-            </a:r>
-            <a:r>
-              <a:rPr lang="pt-PT" dirty="0"/>
-              <a:t>: </a:t>
-            </a:r>
-            <a:r>
-              <a:rPr lang="pt-PT" dirty="0">
-                <a:hlinkClick r:id="rId4"/>
-              </a:rPr>
-              <a:t>https://</a:t>
-            </a:r>
-            <a:r>
-              <a:rPr lang="pt-PT" dirty="0" smtClean="0">
-                <a:hlinkClick r:id="rId4"/>
-              </a:rPr>
-              <a:t>telegram.me/drupalportugal</a:t>
-            </a:r>
-            <a:endParaRPr lang="pt-PT" dirty="0"/>
-          </a:p>
-          <a:p>
-            <a:r>
-              <a:rPr lang="pt-PT" dirty="0" err="1" smtClean="0"/>
-              <a:t>Drupal.org</a:t>
-            </a:r>
-            <a:r>
-              <a:rPr lang="pt-PT" dirty="0"/>
-              <a:t>: </a:t>
-            </a:r>
-            <a:r>
-              <a:rPr lang="pt-PT" dirty="0">
-                <a:hlinkClick r:id="rId5"/>
-              </a:rPr>
-              <a:t>https://</a:t>
-            </a:r>
-            <a:r>
-              <a:rPr lang="pt-PT" dirty="0" smtClean="0">
-                <a:hlinkClick r:id="rId5"/>
-              </a:rPr>
-              <a:t>groups.drupal.org/portugal</a:t>
-            </a:r>
-            <a:endParaRPr lang="pt-PT" dirty="0" smtClean="0"/>
-          </a:p>
-          <a:p>
-            <a:r>
-              <a:rPr lang="pt-PT" dirty="0" err="1" smtClean="0"/>
-              <a:t>Drupal</a:t>
-            </a:r>
-            <a:r>
-              <a:rPr lang="pt-PT" dirty="0" smtClean="0"/>
-              <a:t> </a:t>
-            </a:r>
-            <a:r>
-              <a:rPr lang="pt-PT" dirty="0" err="1" smtClean="0"/>
-              <a:t>Dev</a:t>
-            </a:r>
-            <a:r>
-              <a:rPr lang="pt-PT" dirty="0" smtClean="0"/>
-              <a:t> </a:t>
-            </a:r>
-            <a:r>
-              <a:rPr lang="pt-PT" dirty="0" err="1" smtClean="0"/>
-              <a:t>Days</a:t>
-            </a:r>
-            <a:r>
-              <a:rPr lang="pt-PT" dirty="0"/>
-              <a:t> </a:t>
-            </a:r>
-            <a:r>
-              <a:rPr lang="pt-PT" dirty="0" smtClean="0"/>
-              <a:t>2018: </a:t>
-            </a:r>
-            <a:r>
-              <a:rPr lang="pt-PT" dirty="0" smtClean="0">
-                <a:hlinkClick r:id="rId6"/>
-              </a:rPr>
-              <a:t>https</a:t>
-            </a:r>
-            <a:r>
-              <a:rPr lang="pt-PT" dirty="0">
-                <a:hlinkClick r:id="rId6"/>
-              </a:rPr>
-              <a:t>://lisbon2018.drupaldays.org</a:t>
-            </a:r>
-            <a:r>
-              <a:rPr lang="pt-PT" dirty="0" smtClean="0">
-                <a:hlinkClick r:id="rId6"/>
-              </a:rPr>
-              <a:t>/</a:t>
-            </a:r>
-            <a:endParaRPr lang="pt-PT" dirty="0"/>
-          </a:p>
-          <a:p>
-            <a:endParaRPr lang="pt-PT" dirty="0"/>
-          </a:p>
-        </p:txBody>
-      </p:sp>
-    </p:spTree>
-    <p:extLst>
-      <p:ext uri="{BB962C8B-B14F-4D97-AF65-F5344CB8AC3E}">
-        <p14:creationId xmlns:p14="http://schemas.microsoft.com/office/powerpoint/2010/main" val="560489680"/>
-      </p:ext>
-    </p:extLst>
-  </p:cSld>
-  <p:clrMapOvr>
-    <a:masterClrMapping/>
-  </p:clrMapOvr>
-  <p:timing>
-    <p:tnLst>
-      <p:par>
-        <p:cTn id="1" dur="indefinite" restart="never" nodeType="tmRoot"/>
-      </p:par>
-    </p:tnLst>
-  </p:timing>
-</p:sld>
-</file>
-
 <file path=ppt/slides/slide27.xml><?xml version="1.0" encoding="utf-8"?>
 <p:sld xmlns:a="http://schemas.openxmlformats.org/drawingml/2006/main" xmlns:r="http://schemas.openxmlformats.org/officeDocument/2006/relationships" xmlns:p="http://schemas.openxmlformats.org/presentationml/2006/main">
   <p:cSld>
@@ -23358,95 +23666,113 @@
       <p:sp>
         <p:nvSpPr>
           <p:cNvPr id="2" name="Title 1"/>
-          <p:cNvSpPr txBox="1">
+          <p:cNvSpPr>
             <a:spLocks noGrp="1"/>
           </p:cNvSpPr>
           <p:nvPr>
-            <p:ph type="title" idx="4294967295"/>
+            <p:ph type="title"/>
           </p:nvPr>
         </p:nvSpPr>
-        <p:spPr>
-          <a:xfrm>
-            <a:off x="457200" y="507446"/>
-            <a:ext cx="8229240" cy="677108"/>
-          </a:xfrm>
-        </p:spPr>
-        <p:txBody>
-          <a:bodyPr>
-            <a:spAutoFit/>
-          </a:bodyPr>
-          <a:lstStyle/>
-          <a:p>
-            <a:r>
-              <a:rPr lang="pt-PT" dirty="0" err="1" smtClean="0"/>
-              <a:t>Bibliography</a:t>
-            </a:r>
-            <a:endParaRPr lang="pt-PT" dirty="0"/>
-          </a:p>
-        </p:txBody>
-      </p:sp>
-      <p:sp>
-        <p:nvSpPr>
-          <p:cNvPr id="3" name="Text Placeholder 2"/>
-          <p:cNvSpPr txBox="1">
-            <a:spLocks noGrp="1"/>
-          </p:cNvSpPr>
-          <p:nvPr>
-            <p:ph type="body" idx="4294967295"/>
-          </p:nvPr>
-        </p:nvSpPr>
-        <p:spPr>
-          <a:xfrm>
-            <a:off x="457200" y="1604520"/>
-            <a:ext cx="8229240" cy="3977279"/>
-          </a:xfrm>
-        </p:spPr>
+        <p:spPr/>
         <p:txBody>
           <a:bodyPr/>
           <a:lstStyle/>
           <a:p>
             <a:r>
-              <a:rPr lang="pt-PT" dirty="0" smtClean="0">
+              <a:rPr lang="en-US" dirty="0" smtClean="0">
                 <a:hlinkClick r:id="rId3"/>
               </a:rPr>
-              <a:t>http://drupal.org</a:t>
-            </a:r>
-            <a:endParaRPr lang="pt-PT" dirty="0" smtClean="0"/>
-          </a:p>
-          <a:p>
-            <a:r>
-              <a:rPr lang="pt-PT" dirty="0" smtClean="0">
+              <a:t>Community</a:t>
+            </a:r>
+            <a:endParaRPr lang="en-US" dirty="0"/>
+          </a:p>
+        </p:txBody>
+      </p:sp>
+      <p:sp>
+        <p:nvSpPr>
+          <p:cNvPr id="3" name="Content Placeholder 2"/>
+          <p:cNvSpPr>
+            <a:spLocks noGrp="1"/>
+          </p:cNvSpPr>
+          <p:nvPr>
+            <p:ph idx="1"/>
+          </p:nvPr>
+        </p:nvSpPr>
+        <p:spPr/>
+        <p:txBody>
+          <a:bodyPr/>
+          <a:lstStyle/>
+          <a:p>
+            <a:pPr marL="457200" indent="-457200">
+              <a:buFont typeface="Arial" charset="0"/>
+              <a:buChar char="•"/>
+            </a:pPr>
+            <a:r>
+              <a:rPr lang="en-US" dirty="0" smtClean="0">
                 <a:hlinkClick r:id="rId4"/>
               </a:rPr>
-              <a:t>http://drupal-pt.org</a:t>
-            </a:r>
-            <a:endParaRPr lang="pt-PT" dirty="0" smtClean="0"/>
-          </a:p>
-          <a:p>
-            <a:r>
-              <a:rPr lang="pt-PT" dirty="0">
+              <a:t>Online and Local Groups</a:t>
+            </a:r>
+            <a:endParaRPr lang="en-US" dirty="0" smtClean="0"/>
+          </a:p>
+          <a:p>
+            <a:pPr marL="457200" indent="-457200">
+              <a:buFont typeface="Arial" charset="0"/>
+              <a:buChar char="•"/>
+            </a:pPr>
+            <a:r>
+              <a:rPr lang="en-US" dirty="0" smtClean="0">
                 <a:hlinkClick r:id="rId5"/>
               </a:rPr>
-              <a:t>http://</a:t>
-            </a:r>
-            <a:r>
-              <a:rPr lang="pt-PT" dirty="0" smtClean="0">
-                <a:hlinkClick r:id="rId5"/>
+              <a:t>Events and Meetups</a:t>
+            </a:r>
+            <a:endParaRPr lang="en-US" dirty="0" smtClean="0"/>
+          </a:p>
+          <a:p>
+            <a:pPr marL="457200" indent="-457200">
+              <a:buFont typeface="Arial" charset="0"/>
+              <a:buChar char="•"/>
+            </a:pPr>
+            <a:r>
+              <a:rPr lang="en-US" dirty="0" smtClean="0">
+                <a:hlinkClick r:id="rId6"/>
               </a:rPr>
-              <a:t>www.zyxware.com/articles/4351/list-of-fortune-500-companies-using-drupal-for-their-websites</a:t>
-            </a:r>
-            <a:r>
-              <a:rPr lang="pt-PT" dirty="0" smtClean="0"/>
-              <a:t> </a:t>
-            </a:r>
-            <a:endParaRPr lang="pt-PT" dirty="0"/>
+              <a:t>IRC</a:t>
+            </a:r>
+            <a:endParaRPr lang="en-US" dirty="0" smtClean="0"/>
+          </a:p>
+          <a:p>
+            <a:pPr marL="457200" indent="-457200">
+              <a:buFont typeface="Arial" charset="0"/>
+              <a:buChar char="•"/>
+            </a:pPr>
+            <a:r>
+              <a:rPr lang="en-US" dirty="0" smtClean="0">
+                <a:hlinkClick r:id="rId7" action="ppaction://hlinkfile"/>
+              </a:rPr>
+              <a:t>Planet Drupal</a:t>
+            </a:r>
+            <a:endParaRPr lang="en-US" dirty="0" smtClean="0"/>
+          </a:p>
+          <a:p>
+            <a:pPr marL="457200" indent="-457200">
+              <a:buFont typeface="Arial" charset="0"/>
+              <a:buChar char="•"/>
+            </a:pPr>
+            <a:r>
+              <a:rPr lang="en-US" dirty="0" smtClean="0">
+                <a:hlinkClick r:id="rId3"/>
+              </a:rPr>
+              <a:t>And much, much more</a:t>
+            </a:r>
+            <a:endParaRPr lang="en-US" dirty="0"/>
           </a:p>
         </p:txBody>
       </p:sp>
     </p:spTree>
     <p:extLst>
       <p:ext uri="{BB962C8B-B14F-4D97-AF65-F5344CB8AC3E}">
-        <p14:creationId xmlns:p14="http://schemas.microsoft.com/office/powerpoint/2010/main" val="1595047788"/>
+        <p14:creationId xmlns:p14="http://schemas.microsoft.com/office/powerpoint/2010/main" val="1019892027"/>
       </p:ext>
     </p:extLst>
   </p:cSld>
@@ -23487,12 +23813,12 @@
             <a:spLocks noGrp="1"/>
           </p:cNvSpPr>
           <p:nvPr>
-            <p:ph type="title"/>
+            <p:ph type="title" idx="4294967295"/>
           </p:nvPr>
         </p:nvSpPr>
         <p:spPr>
           <a:xfrm>
-            <a:off x="457200" y="2609846"/>
+            <a:off x="457200" y="507446"/>
             <a:ext cx="8229240" cy="677108"/>
           </a:xfrm>
         </p:spPr>
@@ -23503,13 +23829,151 @@
           <a:lstStyle/>
           <a:p>
             <a:r>
+              <a:rPr lang="pt-PT" dirty="0" smtClean="0"/>
+              <a:t>Portuguese </a:t>
+            </a:r>
+            <a:r>
               <a:rPr lang="pt-PT" dirty="0" err="1" smtClean="0"/>
-              <a:t>Questions</a:t>
+              <a:t>Community</a:t>
+            </a:r>
+            <a:endParaRPr lang="pt-PT" dirty="0"/>
+          </a:p>
+        </p:txBody>
+      </p:sp>
+      <p:sp>
+        <p:nvSpPr>
+          <p:cNvPr id="3" name="Text Placeholder 2"/>
+          <p:cNvSpPr txBox="1">
+            <a:spLocks noGrp="1"/>
+          </p:cNvSpPr>
+          <p:nvPr>
+            <p:ph type="body" idx="4294967295"/>
+          </p:nvPr>
+        </p:nvSpPr>
+        <p:spPr>
+          <a:xfrm>
+            <a:off x="457200" y="1604520"/>
+            <a:ext cx="8229240" cy="3977279"/>
+          </a:xfrm>
+        </p:spPr>
+        <p:txBody>
+          <a:bodyPr/>
+          <a:lstStyle/>
+          <a:p>
+            <a:r>
+              <a:rPr lang="pt-PT" dirty="0"/>
+              <a:t>Website: </a:t>
+            </a:r>
+            <a:r>
+              <a:rPr lang="pt-PT" dirty="0">
+                <a:hlinkClick r:id="rId3"/>
+              </a:rPr>
+              <a:t>http://</a:t>
+            </a:r>
+            <a:r>
+              <a:rPr lang="pt-PT" dirty="0" smtClean="0">
+                <a:hlinkClick r:id="rId3"/>
+              </a:rPr>
+              <a:t>drupal-pt.org/</a:t>
+            </a:r>
+            <a:endParaRPr lang="pt-PT" dirty="0" smtClean="0"/>
+          </a:p>
+          <a:p>
+            <a:r>
+              <a:rPr lang="pt-PT" dirty="0" err="1" smtClean="0"/>
+              <a:t>Telegram</a:t>
+            </a:r>
+            <a:r>
+              <a:rPr lang="pt-PT" dirty="0"/>
+              <a:t>: </a:t>
+            </a:r>
+            <a:r>
+              <a:rPr lang="pt-PT" dirty="0">
+                <a:hlinkClick r:id="rId4"/>
+              </a:rPr>
+              <a:t>https://</a:t>
+            </a:r>
+            <a:r>
+              <a:rPr lang="pt-PT" dirty="0" smtClean="0">
+                <a:hlinkClick r:id="rId4"/>
+              </a:rPr>
+              <a:t>telegram.me/drupalportugal</a:t>
+            </a:r>
+            <a:endParaRPr lang="pt-PT" dirty="0"/>
+          </a:p>
+          <a:p>
+            <a:r>
+              <a:rPr lang="pt-PT" dirty="0" err="1" smtClean="0"/>
+              <a:t>Drupal.org</a:t>
+            </a:r>
+            <a:r>
+              <a:rPr lang="pt-PT" dirty="0"/>
+              <a:t>: </a:t>
+            </a:r>
+            <a:r>
+              <a:rPr lang="pt-PT" dirty="0">
+                <a:hlinkClick r:id="rId5"/>
+              </a:rPr>
+              <a:t>https://</a:t>
+            </a:r>
+            <a:r>
+              <a:rPr lang="pt-PT" dirty="0" smtClean="0">
+                <a:hlinkClick r:id="rId5"/>
+              </a:rPr>
+              <a:t>groups.drupal.org/portugal</a:t>
+            </a:r>
+            <a:endParaRPr lang="pt-PT" dirty="0" smtClean="0"/>
+          </a:p>
+          <a:p>
+            <a:r>
+              <a:rPr lang="pt-PT" dirty="0" err="1" smtClean="0"/>
+              <a:t>Drupal</a:t>
             </a:r>
             <a:r>
               <a:rPr lang="pt-PT" dirty="0" smtClean="0"/>
-              <a:t>?</a:t>
-            </a:r>
+              <a:t> </a:t>
+            </a:r>
+            <a:r>
+              <a:rPr lang="pt-PT" dirty="0" err="1" smtClean="0"/>
+              <a:t>Dev</a:t>
+            </a:r>
+            <a:r>
+              <a:rPr lang="pt-PT" dirty="0" smtClean="0"/>
+              <a:t> </a:t>
+            </a:r>
+            <a:r>
+              <a:rPr lang="pt-PT" dirty="0" err="1" smtClean="0"/>
+              <a:t>Days</a:t>
+            </a:r>
+            <a:r>
+              <a:rPr lang="pt-PT" dirty="0"/>
+              <a:t> </a:t>
+            </a:r>
+            <a:r>
+              <a:rPr lang="pt-PT" dirty="0" smtClean="0"/>
+              <a:t>2018: </a:t>
+            </a:r>
+            <a:r>
+              <a:rPr lang="pt-PT" dirty="0" smtClean="0">
+                <a:hlinkClick r:id="rId6"/>
+              </a:rPr>
+              <a:t>https</a:t>
+            </a:r>
+            <a:r>
+              <a:rPr lang="pt-PT" dirty="0">
+                <a:hlinkClick r:id="rId6"/>
+              </a:rPr>
+              <a:t>://lisbon2018.drupaldays.org</a:t>
+            </a:r>
+            <a:r>
+              <a:rPr lang="pt-PT" dirty="0" smtClean="0">
+                <a:hlinkClick r:id="rId6"/>
+              </a:rPr>
+              <a:t>/</a:t>
+            </a:r>
+            <a:endParaRPr lang="pt-PT" dirty="0"/>
+          </a:p>
+          <a:p>
             <a:endParaRPr lang="pt-PT" dirty="0"/>
           </a:p>
         </p:txBody>
@@ -23517,7 +23981,7 @@
     </p:spTree>
     <p:extLst>
       <p:ext uri="{BB962C8B-B14F-4D97-AF65-F5344CB8AC3E}">
-        <p14:creationId xmlns:p14="http://schemas.microsoft.com/office/powerpoint/2010/main" val="1684209236"/>
+        <p14:creationId xmlns:p14="http://schemas.microsoft.com/office/powerpoint/2010/main" val="560489680"/>
       </p:ext>
     </p:extLst>
   </p:cSld>
@@ -23558,12 +24022,12 @@
             <a:spLocks noGrp="1"/>
           </p:cNvSpPr>
           <p:nvPr>
-            <p:ph type="title"/>
+            <p:ph type="title" idx="4294967295"/>
           </p:nvPr>
         </p:nvSpPr>
         <p:spPr>
           <a:xfrm>
-            <a:off x="457200" y="2609846"/>
+            <a:off x="457200" y="507446"/>
             <a:ext cx="8229240" cy="677108"/>
           </a:xfrm>
         </p:spPr>
@@ -23575,11 +24039,65 @@
           <a:p>
             <a:r>
               <a:rPr lang="pt-PT" dirty="0" err="1" smtClean="0"/>
-              <a:t>Thanks</a:t>
+              <a:t>Bibliography</a:t>
+            </a:r>
+            <a:endParaRPr lang="pt-PT" dirty="0"/>
+          </a:p>
+        </p:txBody>
+      </p:sp>
+      <p:sp>
+        <p:nvSpPr>
+          <p:cNvPr id="3" name="Text Placeholder 2"/>
+          <p:cNvSpPr txBox="1">
+            <a:spLocks noGrp="1"/>
+          </p:cNvSpPr>
+          <p:nvPr>
+            <p:ph type="body" idx="4294967295"/>
+          </p:nvPr>
+        </p:nvSpPr>
+        <p:spPr>
+          <a:xfrm>
+            <a:off x="457200" y="1604520"/>
+            <a:ext cx="8229240" cy="3977279"/>
+          </a:xfrm>
+        </p:spPr>
+        <p:txBody>
+          <a:bodyPr/>
+          <a:lstStyle/>
+          <a:p>
+            <a:r>
+              <a:rPr lang="pt-PT" dirty="0" smtClean="0">
+                <a:hlinkClick r:id="rId3"/>
+              </a:rPr>
+              <a:t>http://drupal.org</a:t>
+            </a:r>
+            <a:endParaRPr lang="pt-PT" dirty="0" smtClean="0"/>
+          </a:p>
+          <a:p>
+            <a:r>
+              <a:rPr lang="pt-PT" dirty="0" smtClean="0">
+                <a:hlinkClick r:id="rId4"/>
+              </a:rPr>
+              <a:t>http://drupal-pt.org</a:t>
+            </a:r>
+            <a:endParaRPr lang="pt-PT" dirty="0" smtClean="0"/>
+          </a:p>
+          <a:p>
+            <a:r>
+              <a:rPr lang="pt-PT" dirty="0">
+                <a:hlinkClick r:id="rId5"/>
+              </a:rPr>
+              <a:t>http://</a:t>
+            </a:r>
+            <a:r>
+              <a:rPr lang="pt-PT" dirty="0" smtClean="0">
+                <a:hlinkClick r:id="rId5"/>
+              </a:rPr>
+              <a:t>www.zyxware.com/articles/4351/list-of-fortune-500-companies-using-drupal-for-their-websites</a:t>
             </a:r>
             <a:r>
               <a:rPr lang="pt-PT" dirty="0" smtClean="0"/>
-              <a:t>!</a:t>
+              <a:t> </a:t>
             </a:r>
             <a:endParaRPr lang="pt-PT" dirty="0"/>
           </a:p>
@@ -23588,7 +24106,7 @@
     </p:spTree>
     <p:extLst>
       <p:ext uri="{BB962C8B-B14F-4D97-AF65-F5344CB8AC3E}">
-        <p14:creationId xmlns:p14="http://schemas.microsoft.com/office/powerpoint/2010/main" val="1523359307"/>
+        <p14:creationId xmlns:p14="http://schemas.microsoft.com/office/powerpoint/2010/main" val="1595047788"/>
       </p:ext>
     </p:extLst>
   </p:cSld>
@@ -23763,6 +24281,148 @@
     <p:extLst>
       <p:ext uri="{BB962C8B-B14F-4D97-AF65-F5344CB8AC3E}">
         <p14:creationId xmlns:p14="http://schemas.microsoft.com/office/powerpoint/2010/main" val="1676351871"/>
+      </p:ext>
+    </p:extLst>
+  </p:cSld>
+  <p:clrMapOvr>
+    <a:masterClrMapping/>
+  </p:clrMapOvr>
+  <p:timing>
+    <p:tnLst>
+      <p:par>
+        <p:cTn id="1" dur="indefinite" restart="never" nodeType="tmRoot"/>
+      </p:par>
+    </p:tnLst>
+  </p:timing>
+</p:sld>
+</file>
+
+<file path=ppt/slides/slide30.xml><?xml version="1.0" encoding="utf-8"?>
+<p:sld xmlns:a="http://schemas.openxmlformats.org/drawingml/2006/main" xmlns:r="http://schemas.openxmlformats.org/officeDocument/2006/relationships" xmlns:p="http://schemas.openxmlformats.org/presentationml/2006/main">
+  <p:cSld>
+    <p:spTree>
+      <p:nvGrpSpPr>
+        <p:cNvPr id="1" name=""/>
+        <p:cNvGrpSpPr/>
+        <p:nvPr/>
+      </p:nvGrpSpPr>
+      <p:grpSpPr>
+        <a:xfrm>
+          <a:off x="0" y="0"/>
+          <a:ext cx="0" cy="0"/>
+          <a:chOff x="0" y="0"/>
+          <a:chExt cx="0" cy="0"/>
+        </a:xfrm>
+      </p:grpSpPr>
+      <p:sp>
+        <p:nvSpPr>
+          <p:cNvPr id="2" name="Title 1"/>
+          <p:cNvSpPr txBox="1">
+            <a:spLocks noGrp="1"/>
+          </p:cNvSpPr>
+          <p:nvPr>
+            <p:ph type="title"/>
+          </p:nvPr>
+        </p:nvSpPr>
+        <p:spPr>
+          <a:xfrm>
+            <a:off x="457200" y="2609846"/>
+            <a:ext cx="8229240" cy="677108"/>
+          </a:xfrm>
+        </p:spPr>
+        <p:txBody>
+          <a:bodyPr>
+            <a:spAutoFit/>
+          </a:bodyPr>
+          <a:lstStyle/>
+          <a:p>
+            <a:r>
+              <a:rPr lang="pt-PT" dirty="0" err="1" smtClean="0"/>
+              <a:t>Questions</a:t>
+            </a:r>
+            <a:r>
+              <a:rPr lang="pt-PT" dirty="0" smtClean="0"/>
+              <a:t>?</a:t>
+            </a:r>
+            <a:endParaRPr lang="pt-PT" dirty="0"/>
+          </a:p>
+        </p:txBody>
+      </p:sp>
+    </p:spTree>
+    <p:extLst>
+      <p:ext uri="{BB962C8B-B14F-4D97-AF65-F5344CB8AC3E}">
+        <p14:creationId xmlns:p14="http://schemas.microsoft.com/office/powerpoint/2010/main" val="1684209236"/>
+      </p:ext>
+    </p:extLst>
+  </p:cSld>
+  <p:clrMapOvr>
+    <a:masterClrMapping/>
+  </p:clrMapOvr>
+  <p:timing>
+    <p:tnLst>
+      <p:par>
+        <p:cTn id="1" dur="indefinite" restart="never" nodeType="tmRoot"/>
+      </p:par>
+    </p:tnLst>
+  </p:timing>
+</p:sld>
+</file>
+
+<file path=ppt/slides/slide31.xml><?xml version="1.0" encoding="utf-8"?>
+<p:sld xmlns:a="http://schemas.openxmlformats.org/drawingml/2006/main" xmlns:r="http://schemas.openxmlformats.org/officeDocument/2006/relationships" xmlns:p="http://schemas.openxmlformats.org/presentationml/2006/main">
+  <p:cSld>
+    <p:spTree>
+      <p:nvGrpSpPr>
+        <p:cNvPr id="1" name=""/>
+        <p:cNvGrpSpPr/>
+        <p:nvPr/>
+      </p:nvGrpSpPr>
+      <p:grpSpPr>
+        <a:xfrm>
+          <a:off x="0" y="0"/>
+          <a:ext cx="0" cy="0"/>
+          <a:chOff x="0" y="0"/>
+          <a:chExt cx="0" cy="0"/>
+        </a:xfrm>
+      </p:grpSpPr>
+      <p:sp>
+        <p:nvSpPr>
+          <p:cNvPr id="2" name="Title 1"/>
+          <p:cNvSpPr txBox="1">
+            <a:spLocks noGrp="1"/>
+          </p:cNvSpPr>
+          <p:nvPr>
+            <p:ph type="title"/>
+          </p:nvPr>
+        </p:nvSpPr>
+        <p:spPr>
+          <a:xfrm>
+            <a:off x="457200" y="2609846"/>
+            <a:ext cx="8229240" cy="677108"/>
+          </a:xfrm>
+        </p:spPr>
+        <p:txBody>
+          <a:bodyPr>
+            <a:spAutoFit/>
+          </a:bodyPr>
+          <a:lstStyle/>
+          <a:p>
+            <a:r>
+              <a:rPr lang="pt-PT" dirty="0" err="1" smtClean="0"/>
+              <a:t>Thanks</a:t>
+            </a:r>
+            <a:r>
+              <a:rPr lang="pt-PT" dirty="0" smtClean="0"/>
+              <a:t>!</a:t>
+            </a:r>
+            <a:endParaRPr lang="pt-PT" dirty="0"/>
+          </a:p>
+        </p:txBody>
+      </p:sp>
+    </p:spTree>
+    <p:extLst>
+      <p:ext uri="{BB962C8B-B14F-4D97-AF65-F5344CB8AC3E}">
+        <p14:creationId xmlns:p14="http://schemas.microsoft.com/office/powerpoint/2010/main" val="1523359307"/>
       </p:ext>
     </p:extLst>
   </p:cSld>

</xml_diff>